<commit_message>
Added Worked Problems and error fixes
</commit_message>
<xml_diff>
--- a/Lecture Slides/IntroSlides/1_Intro.pptx
+++ b/Lecture Slides/IntroSlides/1_Intro.pptx
@@ -154,10 +154,9 @@
           </a:lstStyle>
           <a:p>
             <a:r>
-              <a:rPr lang="en-US" smtClean="0"/>
+              <a:rPr lang="en-US"/>
               <a:t>Click to edit Master title style</a:t>
             </a:r>
-            <a:endParaRPr lang="en-US"/>
           </a:p>
         </p:txBody>
       </p:sp>
@@ -219,10 +218,9 @@
           </a:lstStyle>
           <a:p>
             <a:r>
-              <a:rPr lang="en-US" smtClean="0"/>
+              <a:rPr lang="en-US"/>
               <a:t>Click to edit Master subtitle style</a:t>
             </a:r>
-            <a:endParaRPr lang="en-US"/>
           </a:p>
         </p:txBody>
       </p:sp>
@@ -243,7 +241,7 @@
           <a:p>
             <a:fld id="{AA15078D-9DE8-47D0-8F0F-AA243E1A2060}" type="datetimeFigureOut">
               <a:rPr lang="en-US" smtClean="0"/>
-              <a:t>8/3/2017</a:t>
+              <a:t>9/27/2021</a:t>
             </a:fld>
             <a:endParaRPr lang="en-US"/>
           </a:p>
@@ -337,10 +335,9 @@
           <a:lstStyle/>
           <a:p>
             <a:r>
-              <a:rPr lang="en-US" smtClean="0"/>
+              <a:rPr lang="en-US"/>
               <a:t>Click to edit Master title style</a:t>
             </a:r>
-            <a:endParaRPr lang="en-US"/>
           </a:p>
         </p:txBody>
       </p:sp>
@@ -361,38 +358,37 @@
           <a:p>
             <a:pPr lvl="0"/>
             <a:r>
-              <a:rPr lang="en-US" smtClean="0"/>
+              <a:rPr lang="en-US"/>
               <a:t>Edit Master text styles</a:t>
             </a:r>
           </a:p>
           <a:p>
             <a:pPr lvl="1"/>
             <a:r>
-              <a:rPr lang="en-US" smtClean="0"/>
+              <a:rPr lang="en-US"/>
               <a:t>Second level</a:t>
             </a:r>
           </a:p>
           <a:p>
             <a:pPr lvl="2"/>
             <a:r>
-              <a:rPr lang="en-US" smtClean="0"/>
+              <a:rPr lang="en-US"/>
               <a:t>Third level</a:t>
             </a:r>
           </a:p>
           <a:p>
             <a:pPr lvl="3"/>
             <a:r>
-              <a:rPr lang="en-US" smtClean="0"/>
+              <a:rPr lang="en-US"/>
               <a:t>Fourth level</a:t>
             </a:r>
           </a:p>
           <a:p>
             <a:pPr lvl="4"/>
             <a:r>
-              <a:rPr lang="en-US" smtClean="0"/>
+              <a:rPr lang="en-US"/>
               <a:t>Fifth level</a:t>
             </a:r>
-            <a:endParaRPr lang="en-US"/>
           </a:p>
         </p:txBody>
       </p:sp>
@@ -413,7 +409,7 @@
           <a:p>
             <a:fld id="{AA15078D-9DE8-47D0-8F0F-AA243E1A2060}" type="datetimeFigureOut">
               <a:rPr lang="en-US" smtClean="0"/>
-              <a:t>8/3/2017</a:t>
+              <a:t>9/27/2021</a:t>
             </a:fld>
             <a:endParaRPr lang="en-US"/>
           </a:p>
@@ -512,10 +508,9 @@
           <a:lstStyle/>
           <a:p>
             <a:r>
-              <a:rPr lang="en-US" smtClean="0"/>
+              <a:rPr lang="en-US"/>
               <a:t>Click to edit Master title style</a:t>
             </a:r>
-            <a:endParaRPr lang="en-US"/>
           </a:p>
         </p:txBody>
       </p:sp>
@@ -541,38 +536,37 @@
           <a:p>
             <a:pPr lvl="0"/>
             <a:r>
-              <a:rPr lang="en-US" smtClean="0"/>
+              <a:rPr lang="en-US"/>
               <a:t>Edit Master text styles</a:t>
             </a:r>
           </a:p>
           <a:p>
             <a:pPr lvl="1"/>
             <a:r>
-              <a:rPr lang="en-US" smtClean="0"/>
+              <a:rPr lang="en-US"/>
               <a:t>Second level</a:t>
             </a:r>
           </a:p>
           <a:p>
             <a:pPr lvl="2"/>
             <a:r>
-              <a:rPr lang="en-US" smtClean="0"/>
+              <a:rPr lang="en-US"/>
               <a:t>Third level</a:t>
             </a:r>
           </a:p>
           <a:p>
             <a:pPr lvl="3"/>
             <a:r>
-              <a:rPr lang="en-US" smtClean="0"/>
+              <a:rPr lang="en-US"/>
               <a:t>Fourth level</a:t>
             </a:r>
           </a:p>
           <a:p>
             <a:pPr lvl="4"/>
             <a:r>
-              <a:rPr lang="en-US" smtClean="0"/>
+              <a:rPr lang="en-US"/>
               <a:t>Fifth level</a:t>
             </a:r>
-            <a:endParaRPr lang="en-US"/>
           </a:p>
         </p:txBody>
       </p:sp>
@@ -593,7 +587,7 @@
           <a:p>
             <a:fld id="{AA15078D-9DE8-47D0-8F0F-AA243E1A2060}" type="datetimeFigureOut">
               <a:rPr lang="en-US" smtClean="0"/>
-              <a:t>8/3/2017</a:t>
+              <a:t>9/27/2021</a:t>
             </a:fld>
             <a:endParaRPr lang="en-US"/>
           </a:p>
@@ -687,10 +681,9 @@
           <a:lstStyle/>
           <a:p>
             <a:r>
-              <a:rPr lang="en-US" smtClean="0"/>
+              <a:rPr lang="en-US"/>
               <a:t>Click to edit Master title style</a:t>
             </a:r>
-            <a:endParaRPr lang="en-US"/>
           </a:p>
         </p:txBody>
       </p:sp>
@@ -711,38 +704,37 @@
           <a:p>
             <a:pPr lvl="0"/>
             <a:r>
-              <a:rPr lang="en-US" smtClean="0"/>
+              <a:rPr lang="en-US"/>
               <a:t>Edit Master text styles</a:t>
             </a:r>
           </a:p>
           <a:p>
             <a:pPr lvl="1"/>
             <a:r>
-              <a:rPr lang="en-US" smtClean="0"/>
+              <a:rPr lang="en-US"/>
               <a:t>Second level</a:t>
             </a:r>
           </a:p>
           <a:p>
             <a:pPr lvl="2"/>
             <a:r>
-              <a:rPr lang="en-US" smtClean="0"/>
+              <a:rPr lang="en-US"/>
               <a:t>Third level</a:t>
             </a:r>
           </a:p>
           <a:p>
             <a:pPr lvl="3"/>
             <a:r>
-              <a:rPr lang="en-US" smtClean="0"/>
+              <a:rPr lang="en-US"/>
               <a:t>Fourth level</a:t>
             </a:r>
           </a:p>
           <a:p>
             <a:pPr lvl="4"/>
             <a:r>
-              <a:rPr lang="en-US" smtClean="0"/>
+              <a:rPr lang="en-US"/>
               <a:t>Fifth level</a:t>
             </a:r>
-            <a:endParaRPr lang="en-US"/>
           </a:p>
         </p:txBody>
       </p:sp>
@@ -763,7 +755,7 @@
           <a:p>
             <a:fld id="{AA15078D-9DE8-47D0-8F0F-AA243E1A2060}" type="datetimeFigureOut">
               <a:rPr lang="en-US" smtClean="0"/>
-              <a:t>8/3/2017</a:t>
+              <a:t>9/27/2021</a:t>
             </a:fld>
             <a:endParaRPr lang="en-US"/>
           </a:p>
@@ -866,10 +858,9 @@
           </a:lstStyle>
           <a:p>
             <a:r>
-              <a:rPr lang="en-US" smtClean="0"/>
+              <a:rPr lang="en-US"/>
               <a:t>Click to edit Master title style</a:t>
             </a:r>
-            <a:endParaRPr lang="en-US"/>
           </a:p>
         </p:txBody>
       </p:sp>
@@ -986,7 +977,7 @@
           <a:p>
             <a:pPr lvl="0"/>
             <a:r>
-              <a:rPr lang="en-US" smtClean="0"/>
+              <a:rPr lang="en-US"/>
               <a:t>Edit Master text styles</a:t>
             </a:r>
           </a:p>
@@ -1009,7 +1000,7 @@
           <a:p>
             <a:fld id="{AA15078D-9DE8-47D0-8F0F-AA243E1A2060}" type="datetimeFigureOut">
               <a:rPr lang="en-US" smtClean="0"/>
-              <a:t>8/3/2017</a:t>
+              <a:t>9/27/2021</a:t>
             </a:fld>
             <a:endParaRPr lang="en-US"/>
           </a:p>
@@ -1103,10 +1094,9 @@
           <a:lstStyle/>
           <a:p>
             <a:r>
-              <a:rPr lang="en-US" smtClean="0"/>
+              <a:rPr lang="en-US"/>
               <a:t>Click to edit Master title style</a:t>
             </a:r>
-            <a:endParaRPr lang="en-US"/>
           </a:p>
         </p:txBody>
       </p:sp>
@@ -1132,38 +1122,37 @@
           <a:p>
             <a:pPr lvl="0"/>
             <a:r>
-              <a:rPr lang="en-US" smtClean="0"/>
+              <a:rPr lang="en-US"/>
               <a:t>Edit Master text styles</a:t>
             </a:r>
           </a:p>
           <a:p>
             <a:pPr lvl="1"/>
             <a:r>
-              <a:rPr lang="en-US" smtClean="0"/>
+              <a:rPr lang="en-US"/>
               <a:t>Second level</a:t>
             </a:r>
           </a:p>
           <a:p>
             <a:pPr lvl="2"/>
             <a:r>
-              <a:rPr lang="en-US" smtClean="0"/>
+              <a:rPr lang="en-US"/>
               <a:t>Third level</a:t>
             </a:r>
           </a:p>
           <a:p>
             <a:pPr lvl="3"/>
             <a:r>
-              <a:rPr lang="en-US" smtClean="0"/>
+              <a:rPr lang="en-US"/>
               <a:t>Fourth level</a:t>
             </a:r>
           </a:p>
           <a:p>
             <a:pPr lvl="4"/>
             <a:r>
-              <a:rPr lang="en-US" smtClean="0"/>
+              <a:rPr lang="en-US"/>
               <a:t>Fifth level</a:t>
             </a:r>
-            <a:endParaRPr lang="en-US"/>
           </a:p>
         </p:txBody>
       </p:sp>
@@ -1189,38 +1178,37 @@
           <a:p>
             <a:pPr lvl="0"/>
             <a:r>
-              <a:rPr lang="en-US" smtClean="0"/>
+              <a:rPr lang="en-US"/>
               <a:t>Edit Master text styles</a:t>
             </a:r>
           </a:p>
           <a:p>
             <a:pPr lvl="1"/>
             <a:r>
-              <a:rPr lang="en-US" smtClean="0"/>
+              <a:rPr lang="en-US"/>
               <a:t>Second level</a:t>
             </a:r>
           </a:p>
           <a:p>
             <a:pPr lvl="2"/>
             <a:r>
-              <a:rPr lang="en-US" smtClean="0"/>
+              <a:rPr lang="en-US"/>
               <a:t>Third level</a:t>
             </a:r>
           </a:p>
           <a:p>
             <a:pPr lvl="3"/>
             <a:r>
-              <a:rPr lang="en-US" smtClean="0"/>
+              <a:rPr lang="en-US"/>
               <a:t>Fourth level</a:t>
             </a:r>
           </a:p>
           <a:p>
             <a:pPr lvl="4"/>
             <a:r>
-              <a:rPr lang="en-US" smtClean="0"/>
+              <a:rPr lang="en-US"/>
               <a:t>Fifth level</a:t>
             </a:r>
-            <a:endParaRPr lang="en-US"/>
           </a:p>
         </p:txBody>
       </p:sp>
@@ -1241,7 +1229,7 @@
           <a:p>
             <a:fld id="{AA15078D-9DE8-47D0-8F0F-AA243E1A2060}" type="datetimeFigureOut">
               <a:rPr lang="en-US" smtClean="0"/>
-              <a:t>8/3/2017</a:t>
+              <a:t>9/27/2021</a:t>
             </a:fld>
             <a:endParaRPr lang="en-US"/>
           </a:p>
@@ -1340,10 +1328,9 @@
           <a:lstStyle/>
           <a:p>
             <a:r>
-              <a:rPr lang="en-US" smtClean="0"/>
+              <a:rPr lang="en-US"/>
               <a:t>Click to edit Master title style</a:t>
             </a:r>
-            <a:endParaRPr lang="en-US"/>
           </a:p>
         </p:txBody>
       </p:sp>
@@ -1406,7 +1393,7 @@
           <a:p>
             <a:pPr lvl="0"/>
             <a:r>
-              <a:rPr lang="en-US" smtClean="0"/>
+              <a:rPr lang="en-US"/>
               <a:t>Edit Master text styles</a:t>
             </a:r>
           </a:p>
@@ -1434,38 +1421,37 @@
           <a:p>
             <a:pPr lvl="0"/>
             <a:r>
-              <a:rPr lang="en-US" smtClean="0"/>
+              <a:rPr lang="en-US"/>
               <a:t>Edit Master text styles</a:t>
             </a:r>
           </a:p>
           <a:p>
             <a:pPr lvl="1"/>
             <a:r>
-              <a:rPr lang="en-US" smtClean="0"/>
+              <a:rPr lang="en-US"/>
               <a:t>Second level</a:t>
             </a:r>
           </a:p>
           <a:p>
             <a:pPr lvl="2"/>
             <a:r>
-              <a:rPr lang="en-US" smtClean="0"/>
+              <a:rPr lang="en-US"/>
               <a:t>Third level</a:t>
             </a:r>
           </a:p>
           <a:p>
             <a:pPr lvl="3"/>
             <a:r>
-              <a:rPr lang="en-US" smtClean="0"/>
+              <a:rPr lang="en-US"/>
               <a:t>Fourth level</a:t>
             </a:r>
           </a:p>
           <a:p>
             <a:pPr lvl="4"/>
             <a:r>
-              <a:rPr lang="en-US" smtClean="0"/>
+              <a:rPr lang="en-US"/>
               <a:t>Fifth level</a:t>
             </a:r>
-            <a:endParaRPr lang="en-US"/>
           </a:p>
         </p:txBody>
       </p:sp>
@@ -1528,7 +1514,7 @@
           <a:p>
             <a:pPr lvl="0"/>
             <a:r>
-              <a:rPr lang="en-US" smtClean="0"/>
+              <a:rPr lang="en-US"/>
               <a:t>Edit Master text styles</a:t>
             </a:r>
           </a:p>
@@ -1556,38 +1542,37 @@
           <a:p>
             <a:pPr lvl="0"/>
             <a:r>
-              <a:rPr lang="en-US" smtClean="0"/>
+              <a:rPr lang="en-US"/>
               <a:t>Edit Master text styles</a:t>
             </a:r>
           </a:p>
           <a:p>
             <a:pPr lvl="1"/>
             <a:r>
-              <a:rPr lang="en-US" smtClean="0"/>
+              <a:rPr lang="en-US"/>
               <a:t>Second level</a:t>
             </a:r>
           </a:p>
           <a:p>
             <a:pPr lvl="2"/>
             <a:r>
-              <a:rPr lang="en-US" smtClean="0"/>
+              <a:rPr lang="en-US"/>
               <a:t>Third level</a:t>
             </a:r>
           </a:p>
           <a:p>
             <a:pPr lvl="3"/>
             <a:r>
-              <a:rPr lang="en-US" smtClean="0"/>
+              <a:rPr lang="en-US"/>
               <a:t>Fourth level</a:t>
             </a:r>
           </a:p>
           <a:p>
             <a:pPr lvl="4"/>
             <a:r>
-              <a:rPr lang="en-US" smtClean="0"/>
+              <a:rPr lang="en-US"/>
               <a:t>Fifth level</a:t>
             </a:r>
-            <a:endParaRPr lang="en-US"/>
           </a:p>
         </p:txBody>
       </p:sp>
@@ -1608,7 +1593,7 @@
           <a:p>
             <a:fld id="{AA15078D-9DE8-47D0-8F0F-AA243E1A2060}" type="datetimeFigureOut">
               <a:rPr lang="en-US" smtClean="0"/>
-              <a:t>8/3/2017</a:t>
+              <a:t>9/27/2021</a:t>
             </a:fld>
             <a:endParaRPr lang="en-US"/>
           </a:p>
@@ -1702,10 +1687,9 @@
           <a:lstStyle/>
           <a:p>
             <a:r>
-              <a:rPr lang="en-US" smtClean="0"/>
+              <a:rPr lang="en-US"/>
               <a:t>Click to edit Master title style</a:t>
             </a:r>
-            <a:endParaRPr lang="en-US"/>
           </a:p>
         </p:txBody>
       </p:sp>
@@ -1726,7 +1710,7 @@
           <a:p>
             <a:fld id="{AA15078D-9DE8-47D0-8F0F-AA243E1A2060}" type="datetimeFigureOut">
               <a:rPr lang="en-US" smtClean="0"/>
-              <a:t>8/3/2017</a:t>
+              <a:t>9/27/2021</a:t>
             </a:fld>
             <a:endParaRPr lang="en-US"/>
           </a:p>
@@ -1821,7 +1805,7 @@
           <a:p>
             <a:fld id="{AA15078D-9DE8-47D0-8F0F-AA243E1A2060}" type="datetimeFigureOut">
               <a:rPr lang="en-US" smtClean="0"/>
-              <a:t>8/3/2017</a:t>
+              <a:t>9/27/2021</a:t>
             </a:fld>
             <a:endParaRPr lang="en-US"/>
           </a:p>
@@ -1924,10 +1908,9 @@
           </a:lstStyle>
           <a:p>
             <a:r>
-              <a:rPr lang="en-US" smtClean="0"/>
+              <a:rPr lang="en-US"/>
               <a:t>Click to edit Master title style</a:t>
             </a:r>
-            <a:endParaRPr lang="en-US"/>
           </a:p>
         </p:txBody>
       </p:sp>
@@ -1981,38 +1964,37 @@
           <a:p>
             <a:pPr lvl="0"/>
             <a:r>
-              <a:rPr lang="en-US" smtClean="0"/>
+              <a:rPr lang="en-US"/>
               <a:t>Edit Master text styles</a:t>
             </a:r>
           </a:p>
           <a:p>
             <a:pPr lvl="1"/>
             <a:r>
-              <a:rPr lang="en-US" smtClean="0"/>
+              <a:rPr lang="en-US"/>
               <a:t>Second level</a:t>
             </a:r>
           </a:p>
           <a:p>
             <a:pPr lvl="2"/>
             <a:r>
-              <a:rPr lang="en-US" smtClean="0"/>
+              <a:rPr lang="en-US"/>
               <a:t>Third level</a:t>
             </a:r>
           </a:p>
           <a:p>
             <a:pPr lvl="3"/>
             <a:r>
-              <a:rPr lang="en-US" smtClean="0"/>
+              <a:rPr lang="en-US"/>
               <a:t>Fourth level</a:t>
             </a:r>
           </a:p>
           <a:p>
             <a:pPr lvl="4"/>
             <a:r>
-              <a:rPr lang="en-US" smtClean="0"/>
+              <a:rPr lang="en-US"/>
               <a:t>Fifth level</a:t>
             </a:r>
-            <a:endParaRPr lang="en-US"/>
           </a:p>
         </p:txBody>
       </p:sp>
@@ -2075,7 +2057,7 @@
           <a:p>
             <a:pPr lvl="0"/>
             <a:r>
-              <a:rPr lang="en-US" smtClean="0"/>
+              <a:rPr lang="en-US"/>
               <a:t>Edit Master text styles</a:t>
             </a:r>
           </a:p>
@@ -2098,7 +2080,7 @@
           <a:p>
             <a:fld id="{AA15078D-9DE8-47D0-8F0F-AA243E1A2060}" type="datetimeFigureOut">
               <a:rPr lang="en-US" smtClean="0"/>
-              <a:t>8/3/2017</a:t>
+              <a:t>9/27/2021</a:t>
             </a:fld>
             <a:endParaRPr lang="en-US"/>
           </a:p>
@@ -2201,10 +2183,9 @@
           </a:lstStyle>
           <a:p>
             <a:r>
-              <a:rPr lang="en-US" smtClean="0"/>
+              <a:rPr lang="en-US"/>
               <a:t>Click to edit Master title style</a:t>
             </a:r>
-            <a:endParaRPr lang="en-US"/>
           </a:p>
         </p:txBody>
       </p:sp>
@@ -2328,7 +2309,7 @@
           <a:p>
             <a:pPr lvl="0"/>
             <a:r>
-              <a:rPr lang="en-US" smtClean="0"/>
+              <a:rPr lang="en-US"/>
               <a:t>Edit Master text styles</a:t>
             </a:r>
           </a:p>
@@ -2351,7 +2332,7 @@
           <a:p>
             <a:fld id="{AA15078D-9DE8-47D0-8F0F-AA243E1A2060}" type="datetimeFigureOut">
               <a:rPr lang="en-US" smtClean="0"/>
-              <a:t>8/3/2017</a:t>
+              <a:t>9/27/2021</a:t>
             </a:fld>
             <a:endParaRPr lang="en-US"/>
           </a:p>
@@ -2460,10 +2441,9 @@
           <a:lstStyle/>
           <a:p>
             <a:r>
-              <a:rPr lang="en-US" smtClean="0"/>
+              <a:rPr lang="en-US"/>
               <a:t>Click to edit Master title style</a:t>
             </a:r>
-            <a:endParaRPr lang="en-US"/>
           </a:p>
         </p:txBody>
       </p:sp>
@@ -2494,38 +2474,37 @@
           <a:p>
             <a:pPr lvl="0"/>
             <a:r>
-              <a:rPr lang="en-US" smtClean="0"/>
+              <a:rPr lang="en-US"/>
               <a:t>Edit Master text styles</a:t>
             </a:r>
           </a:p>
           <a:p>
             <a:pPr lvl="1"/>
             <a:r>
-              <a:rPr lang="en-US" smtClean="0"/>
+              <a:rPr lang="en-US"/>
               <a:t>Second level</a:t>
             </a:r>
           </a:p>
           <a:p>
             <a:pPr lvl="2"/>
             <a:r>
-              <a:rPr lang="en-US" smtClean="0"/>
+              <a:rPr lang="en-US"/>
               <a:t>Third level</a:t>
             </a:r>
           </a:p>
           <a:p>
             <a:pPr lvl="3"/>
             <a:r>
-              <a:rPr lang="en-US" smtClean="0"/>
+              <a:rPr lang="en-US"/>
               <a:t>Fourth level</a:t>
             </a:r>
           </a:p>
           <a:p>
             <a:pPr lvl="4"/>
             <a:r>
-              <a:rPr lang="en-US" smtClean="0"/>
+              <a:rPr lang="en-US"/>
               <a:t>Fifth level</a:t>
             </a:r>
-            <a:endParaRPr lang="en-US"/>
           </a:p>
         </p:txBody>
       </p:sp>
@@ -2564,7 +2543,7 @@
           <a:p>
             <a:fld id="{AA15078D-9DE8-47D0-8F0F-AA243E1A2060}" type="datetimeFigureOut">
               <a:rPr lang="en-US" smtClean="0"/>
-              <a:t>8/3/2017</a:t>
+              <a:t>9/27/2021</a:t>
             </a:fld>
             <a:endParaRPr lang="en-US"/>
           </a:p>
@@ -2971,14 +2950,20 @@
       </p:grpSpPr>
       <p:sp>
         <p:nvSpPr>
-          <p:cNvPr id="57" name="Rounded Rectangle 56"/>
+          <p:cNvPr id="61" name="Rounded Rectangle 56">
+            <a:extLst>
+              <a:ext uri="{FF2B5EF4-FFF2-40B4-BE49-F238E27FC236}">
+                <a16:creationId xmlns:a16="http://schemas.microsoft.com/office/drawing/2014/main" id="{32252143-D352-4A84-B5D2-E6443A1BC14A}"/>
+              </a:ext>
+            </a:extLst>
+          </p:cNvPr>
           <p:cNvSpPr/>
           <p:nvPr/>
         </p:nvSpPr>
         <p:spPr>
           <a:xfrm>
-            <a:off x="2920997" y="388421"/>
-            <a:ext cx="6123710" cy="1265381"/>
+            <a:off x="3048246" y="3263873"/>
+            <a:ext cx="5831349" cy="1155175"/>
           </a:xfrm>
           <a:prstGeom prst="roundRect">
             <a:avLst/>
@@ -3011,7 +2996,116 @@
           <a:lstStyle/>
           <a:p>
             <a:pPr algn="ctr"/>
-            <a:endParaRPr lang="en-US"/>
+            <a:endParaRPr lang="en-US" dirty="0"/>
+          </a:p>
+          <a:p>
+            <a:pPr algn="ctr"/>
+            <a:endParaRPr lang="en-US" dirty="0"/>
+          </a:p>
+          <a:p>
+            <a:pPr algn="ctr"/>
+            <a:endParaRPr lang="en-US" dirty="0"/>
+          </a:p>
+          <a:p>
+            <a:pPr algn="ctr"/>
+            <a:endParaRPr lang="en-US" dirty="0"/>
+          </a:p>
+          <a:p>
+            <a:pPr algn="ctr"/>
+            <a:endParaRPr lang="en-US" dirty="0"/>
+          </a:p>
+          <a:p>
+            <a:pPr algn="ctr"/>
+            <a:endParaRPr lang="en-US" dirty="0"/>
+          </a:p>
+          <a:p>
+            <a:pPr algn="ctr"/>
+            <a:endParaRPr lang="en-US" dirty="0"/>
+          </a:p>
+          <a:p>
+            <a:pPr algn="ctr"/>
+            <a:endParaRPr lang="en-US" dirty="0"/>
+          </a:p>
+        </p:txBody>
+      </p:sp>
+      <p:sp>
+        <p:nvSpPr>
+          <p:cNvPr id="57" name="Rounded Rectangle 56"/>
+          <p:cNvSpPr/>
+          <p:nvPr/>
+        </p:nvSpPr>
+        <p:spPr>
+          <a:xfrm>
+            <a:off x="3318278" y="223572"/>
+            <a:ext cx="5342837" cy="2749239"/>
+          </a:xfrm>
+          <a:prstGeom prst="roundRect">
+            <a:avLst/>
+          </a:prstGeom>
+          <a:solidFill>
+            <a:schemeClr val="accent1">
+              <a:lumMod val="40000"/>
+              <a:lumOff val="60000"/>
+            </a:schemeClr>
+          </a:solidFill>
+        </p:spPr>
+        <p:style>
+          <a:lnRef idx="2">
+            <a:schemeClr val="accent1">
+              <a:shade val="50000"/>
+            </a:schemeClr>
+          </a:lnRef>
+          <a:fillRef idx="1">
+            <a:schemeClr val="accent1"/>
+          </a:fillRef>
+          <a:effectRef idx="0">
+            <a:schemeClr val="accent1"/>
+          </a:effectRef>
+          <a:fontRef idx="minor">
+            <a:schemeClr val="lt1"/>
+          </a:fontRef>
+        </p:style>
+        <p:txBody>
+          <a:bodyPr rtlCol="0" anchor="ctr"/>
+          <a:lstStyle/>
+          <a:p>
+            <a:pPr algn="ctr"/>
+            <a:r>
+              <a:rPr lang="en-US" dirty="0"/>
+              <a:t>Bodies</a:t>
+            </a:r>
+          </a:p>
+          <a:p>
+            <a:pPr algn="ctr"/>
+            <a:endParaRPr lang="en-US" dirty="0"/>
+          </a:p>
+          <a:p>
+            <a:pPr algn="ctr"/>
+            <a:endParaRPr lang="en-US" dirty="0"/>
+          </a:p>
+          <a:p>
+            <a:pPr algn="ctr"/>
+            <a:endParaRPr lang="en-US" dirty="0"/>
+          </a:p>
+          <a:p>
+            <a:pPr algn="ctr"/>
+            <a:endParaRPr lang="en-US" dirty="0"/>
+          </a:p>
+          <a:p>
+            <a:pPr algn="ctr"/>
+            <a:endParaRPr lang="en-US" dirty="0"/>
+          </a:p>
+          <a:p>
+            <a:pPr algn="ctr"/>
+            <a:endParaRPr lang="en-US" dirty="0"/>
+          </a:p>
+          <a:p>
+            <a:pPr algn="ctr"/>
+            <a:endParaRPr lang="en-US" dirty="0"/>
+          </a:p>
+          <a:p>
+            <a:pPr algn="ctr"/>
+            <a:endParaRPr lang="en-US" dirty="0"/>
           </a:p>
         </p:txBody>
       </p:sp>
@@ -3023,7 +3117,7 @@
         </p:nvSpPr>
         <p:spPr>
           <a:xfrm>
-            <a:off x="5202381" y="4075188"/>
+            <a:off x="5209224" y="3411538"/>
             <a:ext cx="1560945" cy="877454"/>
           </a:xfrm>
           <a:prstGeom prst="roundRect">
@@ -3052,10 +3146,9 @@
           <a:p>
             <a:pPr algn="ctr"/>
             <a:r>
-              <a:rPr lang="en-US" dirty="0" smtClean="0"/>
+              <a:rPr lang="en-US" dirty="0"/>
               <a:t>Newton’s Second Law</a:t>
             </a:r>
-            <a:endParaRPr lang="en-US" dirty="0"/>
           </a:p>
         </p:txBody>
       </p:sp>
@@ -3063,15 +3156,16 @@
         <p:nvCxnSpPr>
           <p:cNvPr id="14" name="Straight Arrow Connector 13"/>
           <p:cNvCxnSpPr>
-            <a:stCxn id="5" idx="2"/>
+            <a:cxnSpLocks/>
+            <a:stCxn id="61" idx="2"/>
             <a:endCxn id="31" idx="0"/>
           </p:cNvCxnSpPr>
           <p:nvPr/>
         </p:nvCxnSpPr>
         <p:spPr>
-          <a:xfrm flipH="1">
-            <a:off x="5982853" y="4952642"/>
-            <a:ext cx="1" cy="718738"/>
+          <a:xfrm>
+            <a:off x="5963921" y="4419048"/>
+            <a:ext cx="1184156" cy="866438"/>
           </a:xfrm>
           <a:prstGeom prst="straightConnector1">
             <a:avLst/>
@@ -3097,13 +3191,13 @@
       </p:cxnSp>
       <p:sp>
         <p:nvSpPr>
-          <p:cNvPr id="27" name="Rounded Rectangle 26"/>
+          <p:cNvPr id="28" name="Rounded Rectangle 27"/>
           <p:cNvSpPr/>
           <p:nvPr/>
         </p:nvSpPr>
         <p:spPr>
           <a:xfrm>
-            <a:off x="5202380" y="548664"/>
+            <a:off x="3318278" y="3411538"/>
             <a:ext cx="1560945" cy="877454"/>
           </a:xfrm>
           <a:prstGeom prst="roundRect">
@@ -3132,22 +3226,21 @@
           <a:p>
             <a:pPr algn="ctr"/>
             <a:r>
-              <a:rPr lang="en-US" dirty="0" smtClean="0"/>
-              <a:t>Bodies</a:t>
-            </a:r>
-            <a:endParaRPr lang="en-US" dirty="0"/>
-          </a:p>
-        </p:txBody>
-      </p:sp>
-      <p:sp>
-        <p:nvSpPr>
-          <p:cNvPr id="28" name="Rounded Rectangle 27"/>
+              <a:rPr lang="en-US" dirty="0"/>
+              <a:t>Newton’s First Law</a:t>
+            </a:r>
+          </a:p>
+        </p:txBody>
+      </p:sp>
+      <p:sp>
+        <p:nvSpPr>
+          <p:cNvPr id="29" name="Rounded Rectangle 28"/>
           <p:cNvSpPr/>
           <p:nvPr/>
         </p:nvSpPr>
         <p:spPr>
           <a:xfrm>
-            <a:off x="5202381" y="2669801"/>
+            <a:off x="7087295" y="3411538"/>
             <a:ext cx="1560945" cy="877454"/>
           </a:xfrm>
           <a:prstGeom prst="roundRect">
@@ -3176,34 +3269,108 @@
           <a:p>
             <a:pPr algn="ctr"/>
             <a:r>
-              <a:rPr lang="en-US" dirty="0" smtClean="0"/>
-              <a:t>Newton’s </a:t>
-            </a:r>
-            <a:r>
-              <a:rPr lang="en-US" dirty="0" smtClean="0"/>
-              <a:t>First</a:t>
-            </a:r>
-            <a:r>
-              <a:rPr lang="en-US" dirty="0" smtClean="0"/>
-              <a:t> </a:t>
-            </a:r>
-            <a:r>
-              <a:rPr lang="en-US" dirty="0" smtClean="0"/>
-              <a:t>Law</a:t>
-            </a:r>
-            <a:endParaRPr lang="en-US" dirty="0"/>
-          </a:p>
-        </p:txBody>
-      </p:sp>
-      <p:sp>
-        <p:nvSpPr>
-          <p:cNvPr id="29" name="Rounded Rectangle 28"/>
+              <a:rPr lang="en-US" dirty="0"/>
+              <a:t>Newton’s Third Law</a:t>
+            </a:r>
+          </a:p>
+        </p:txBody>
+      </p:sp>
+      <p:sp>
+        <p:nvSpPr>
+          <p:cNvPr id="31" name="Rounded Rectangle 30"/>
           <p:cNvSpPr/>
           <p:nvPr/>
         </p:nvSpPr>
         <p:spPr>
           <a:xfrm>
-            <a:off x="7227453" y="2669801"/>
+            <a:off x="6367604" y="5285486"/>
+            <a:ext cx="1560945" cy="877454"/>
+          </a:xfrm>
+          <a:prstGeom prst="roundRect">
+            <a:avLst/>
+          </a:prstGeom>
+        </p:spPr>
+        <p:style>
+          <a:lnRef idx="2">
+            <a:schemeClr val="accent2">
+              <a:shade val="50000"/>
+            </a:schemeClr>
+          </a:lnRef>
+          <a:fillRef idx="1">
+            <a:schemeClr val="accent2"/>
+          </a:fillRef>
+          <a:effectRef idx="0">
+            <a:schemeClr val="accent2"/>
+          </a:effectRef>
+          <a:fontRef idx="minor">
+            <a:schemeClr val="lt1"/>
+          </a:fontRef>
+        </p:style>
+        <p:txBody>
+          <a:bodyPr rtlCol="0" anchor="ctr"/>
+          <a:lstStyle/>
+          <a:p>
+            <a:pPr algn="ctr"/>
+            <a:r>
+              <a:rPr lang="en-US" dirty="0"/>
+              <a:t>Kinetic Analysis</a:t>
+            </a:r>
+          </a:p>
+        </p:txBody>
+      </p:sp>
+      <p:sp>
+        <p:nvSpPr>
+          <p:cNvPr id="32" name="Rounded Rectangle 31"/>
+          <p:cNvSpPr/>
+          <p:nvPr/>
+        </p:nvSpPr>
+        <p:spPr>
+          <a:xfrm>
+            <a:off x="3741015" y="858977"/>
+            <a:ext cx="1990238" cy="640080"/>
+          </a:xfrm>
+          <a:prstGeom prst="roundRect">
+            <a:avLst/>
+          </a:prstGeom>
+        </p:spPr>
+        <p:style>
+          <a:lnRef idx="2">
+            <a:schemeClr val="accent1">
+              <a:shade val="50000"/>
+            </a:schemeClr>
+          </a:lnRef>
+          <a:fillRef idx="1">
+            <a:schemeClr val="accent1"/>
+          </a:fillRef>
+          <a:effectRef idx="0">
+            <a:schemeClr val="accent1"/>
+          </a:effectRef>
+          <a:fontRef idx="minor">
+            <a:schemeClr val="lt1"/>
+          </a:fontRef>
+        </p:style>
+        <p:txBody>
+          <a:bodyPr rtlCol="0" anchor="ctr"/>
+          <a:lstStyle/>
+          <a:p>
+            <a:pPr algn="ctr"/>
+            <a:r>
+              <a:rPr lang="en-US"/>
+              <a:t>Forces</a:t>
+            </a:r>
+            <a:endParaRPr lang="en-US" dirty="0"/>
+          </a:p>
+        </p:txBody>
+      </p:sp>
+      <p:sp>
+        <p:nvSpPr>
+          <p:cNvPr id="35" name="Rounded Rectangle 34"/>
+          <p:cNvSpPr/>
+          <p:nvPr/>
+        </p:nvSpPr>
+        <p:spPr>
+          <a:xfrm>
+            <a:off x="9155002" y="1150513"/>
             <a:ext cx="1560945" cy="877454"/>
           </a:xfrm>
           <a:prstGeom prst="roundRect">
@@ -3232,26 +3399,21 @@
           <a:p>
             <a:pPr algn="ctr"/>
             <a:r>
-              <a:rPr lang="en-US" dirty="0" smtClean="0"/>
-              <a:t>Newton’s Third </a:t>
-            </a:r>
-            <a:r>
-              <a:rPr lang="en-US" dirty="0" smtClean="0"/>
-              <a:t>Law</a:t>
-            </a:r>
-            <a:endParaRPr lang="en-US" dirty="0"/>
-          </a:p>
-        </p:txBody>
-      </p:sp>
-      <p:sp>
-        <p:nvSpPr>
-          <p:cNvPr id="31" name="Rounded Rectangle 30"/>
+              <a:rPr lang="en-US" dirty="0"/>
+              <a:t>Free Body Diagrams</a:t>
+            </a:r>
+          </a:p>
+        </p:txBody>
+      </p:sp>
+      <p:sp>
+        <p:nvSpPr>
+          <p:cNvPr id="36" name="Rounded Rectangle 35"/>
           <p:cNvSpPr/>
           <p:nvPr/>
         </p:nvSpPr>
         <p:spPr>
           <a:xfrm>
-            <a:off x="5202380" y="5671380"/>
+            <a:off x="4050844" y="5285486"/>
             <a:ext cx="1560945" cy="877454"/>
           </a:xfrm>
           <a:prstGeom prst="roundRect">
@@ -3280,186 +3442,9 @@
           <a:p>
             <a:pPr algn="ctr"/>
             <a:r>
-              <a:rPr lang="en-US" dirty="0" smtClean="0"/>
-              <a:t>Static Equilibrium</a:t>
-            </a:r>
-            <a:endParaRPr lang="en-US" dirty="0"/>
-          </a:p>
-        </p:txBody>
-      </p:sp>
-      <p:sp>
-        <p:nvSpPr>
-          <p:cNvPr id="32" name="Rounded Rectangle 31"/>
-          <p:cNvSpPr/>
-          <p:nvPr/>
-        </p:nvSpPr>
-        <p:spPr>
-          <a:xfrm>
-            <a:off x="3177307" y="548664"/>
-            <a:ext cx="1560945" cy="877454"/>
-          </a:xfrm>
-          <a:prstGeom prst="roundRect">
-            <a:avLst/>
-          </a:prstGeom>
-        </p:spPr>
-        <p:style>
-          <a:lnRef idx="2">
-            <a:schemeClr val="accent1">
-              <a:shade val="50000"/>
-            </a:schemeClr>
-          </a:lnRef>
-          <a:fillRef idx="1">
-            <a:schemeClr val="accent1"/>
-          </a:fillRef>
-          <a:effectRef idx="0">
-            <a:schemeClr val="accent1"/>
-          </a:effectRef>
-          <a:fontRef idx="minor">
-            <a:schemeClr val="lt1"/>
-          </a:fontRef>
-        </p:style>
-        <p:txBody>
-          <a:bodyPr rtlCol="0" anchor="ctr"/>
-          <a:lstStyle/>
-          <a:p>
-            <a:pPr algn="ctr"/>
-            <a:r>
-              <a:rPr lang="en-US" dirty="0" smtClean="0"/>
-              <a:t>Forces</a:t>
-            </a:r>
-            <a:endParaRPr lang="en-US" dirty="0"/>
-          </a:p>
-        </p:txBody>
-      </p:sp>
-      <p:sp>
-        <p:nvSpPr>
-          <p:cNvPr id="34" name="Rounded Rectangle 33"/>
-          <p:cNvSpPr/>
-          <p:nvPr/>
-        </p:nvSpPr>
-        <p:spPr>
-          <a:xfrm>
-            <a:off x="7227452" y="547764"/>
-            <a:ext cx="1560945" cy="877454"/>
-          </a:xfrm>
-          <a:prstGeom prst="roundRect">
-            <a:avLst/>
-          </a:prstGeom>
-        </p:spPr>
-        <p:style>
-          <a:lnRef idx="2">
-            <a:schemeClr val="accent1">
-              <a:shade val="50000"/>
-            </a:schemeClr>
-          </a:lnRef>
-          <a:fillRef idx="1">
-            <a:schemeClr val="accent1"/>
-          </a:fillRef>
-          <a:effectRef idx="0">
-            <a:schemeClr val="accent1"/>
-          </a:effectRef>
-          <a:fontRef idx="minor">
-            <a:schemeClr val="lt1"/>
-          </a:fontRef>
-        </p:style>
-        <p:txBody>
-          <a:bodyPr rtlCol="0" anchor="ctr"/>
-          <a:lstStyle/>
-          <a:p>
-            <a:pPr algn="ctr"/>
-            <a:r>
-              <a:rPr lang="en-US" dirty="0" smtClean="0"/>
-              <a:t>Moments</a:t>
-            </a:r>
-            <a:endParaRPr lang="en-US" dirty="0"/>
-          </a:p>
-        </p:txBody>
-      </p:sp>
-      <p:sp>
-        <p:nvSpPr>
-          <p:cNvPr id="35" name="Rounded Rectangle 34"/>
-          <p:cNvSpPr/>
-          <p:nvPr/>
-        </p:nvSpPr>
-        <p:spPr>
-          <a:xfrm>
-            <a:off x="3177307" y="2673331"/>
-            <a:ext cx="1560945" cy="877454"/>
-          </a:xfrm>
-          <a:prstGeom prst="roundRect">
-            <a:avLst/>
-          </a:prstGeom>
-        </p:spPr>
-        <p:style>
-          <a:lnRef idx="2">
-            <a:schemeClr val="accent1">
-              <a:shade val="50000"/>
-            </a:schemeClr>
-          </a:lnRef>
-          <a:fillRef idx="1">
-            <a:schemeClr val="accent1"/>
-          </a:fillRef>
-          <a:effectRef idx="0">
-            <a:schemeClr val="accent1"/>
-          </a:effectRef>
-          <a:fontRef idx="minor">
-            <a:schemeClr val="lt1"/>
-          </a:fontRef>
-        </p:style>
-        <p:txBody>
-          <a:bodyPr rtlCol="0" anchor="ctr"/>
-          <a:lstStyle/>
-          <a:p>
-            <a:pPr algn="ctr"/>
-            <a:r>
-              <a:rPr lang="en-US" dirty="0" smtClean="0"/>
-              <a:t>Free Body Diagrams</a:t>
-            </a:r>
-            <a:endParaRPr lang="en-US" dirty="0"/>
-          </a:p>
-        </p:txBody>
-      </p:sp>
-      <p:sp>
-        <p:nvSpPr>
-          <p:cNvPr id="36" name="Rounded Rectangle 35"/>
-          <p:cNvSpPr/>
-          <p:nvPr/>
-        </p:nvSpPr>
-        <p:spPr>
-          <a:xfrm>
-            <a:off x="3177307" y="5671380"/>
-            <a:ext cx="1560945" cy="877454"/>
-          </a:xfrm>
-          <a:prstGeom prst="roundRect">
-            <a:avLst/>
-          </a:prstGeom>
-        </p:spPr>
-        <p:style>
-          <a:lnRef idx="2">
-            <a:schemeClr val="accent2">
-              <a:shade val="50000"/>
-            </a:schemeClr>
-          </a:lnRef>
-          <a:fillRef idx="1">
-            <a:schemeClr val="accent2"/>
-          </a:fillRef>
-          <a:effectRef idx="0">
-            <a:schemeClr val="accent2"/>
-          </a:effectRef>
-          <a:fontRef idx="minor">
-            <a:schemeClr val="lt1"/>
-          </a:fontRef>
-        </p:style>
-        <p:txBody>
-          <a:bodyPr rtlCol="0" anchor="ctr"/>
-          <a:lstStyle/>
-          <a:p>
-            <a:pPr algn="ctr"/>
-            <a:r>
-              <a:rPr lang="en-US" dirty="0" smtClean="0"/>
+              <a:rPr lang="en-US" dirty="0"/>
               <a:t>Equilibrium Analysis </a:t>
             </a:r>
-            <a:endParaRPr lang="en-US" dirty="0"/>
           </a:p>
         </p:txBody>
       </p:sp>
@@ -3467,15 +3452,16 @@
         <p:nvCxnSpPr>
           <p:cNvPr id="49" name="Straight Arrow Connector 48"/>
           <p:cNvCxnSpPr>
-            <a:stCxn id="28" idx="2"/>
+            <a:cxnSpLocks/>
+            <a:stCxn id="57" idx="2"/>
             <a:endCxn id="5" idx="0"/>
           </p:cNvCxnSpPr>
           <p:nvPr/>
         </p:nvCxnSpPr>
         <p:spPr>
           <a:xfrm>
-            <a:off x="5982854" y="3547255"/>
-            <a:ext cx="0" cy="527933"/>
+            <a:off x="5989697" y="2972811"/>
+            <a:ext cx="0" cy="438727"/>
           </a:xfrm>
           <a:prstGeom prst="straightConnector1">
             <a:avLst/>
@@ -3503,15 +3489,16 @@
         <p:nvCxnSpPr>
           <p:cNvPr id="65" name="Straight Arrow Connector 64"/>
           <p:cNvCxnSpPr>
-            <a:stCxn id="57" idx="2"/>
-            <a:endCxn id="35" idx="0"/>
+            <a:cxnSpLocks/>
+            <a:stCxn id="57" idx="3"/>
+            <a:endCxn id="35" idx="1"/>
           </p:cNvCxnSpPr>
           <p:nvPr/>
         </p:nvCxnSpPr>
         <p:spPr>
-          <a:xfrm flipH="1">
-            <a:off x="3957780" y="1653802"/>
-            <a:ext cx="2025072" cy="1019529"/>
+          <a:xfrm flipV="1">
+            <a:off x="8661115" y="1589240"/>
+            <a:ext cx="493887" cy="8952"/>
           </a:xfrm>
           <a:prstGeom prst="straightConnector1">
             <a:avLst/>
@@ -3539,15 +3526,16 @@
         <p:nvCxnSpPr>
           <p:cNvPr id="68" name="Straight Arrow Connector 67"/>
           <p:cNvCxnSpPr>
+            <a:cxnSpLocks/>
             <a:stCxn id="57" idx="2"/>
             <a:endCxn id="28" idx="0"/>
           </p:cNvCxnSpPr>
           <p:nvPr/>
         </p:nvCxnSpPr>
         <p:spPr>
-          <a:xfrm>
-            <a:off x="5982852" y="1653802"/>
-            <a:ext cx="2" cy="1015999"/>
+          <a:xfrm flipH="1">
+            <a:off x="4098751" y="2972811"/>
+            <a:ext cx="1890946" cy="438727"/>
           </a:xfrm>
           <a:prstGeom prst="straightConnector1">
             <a:avLst/>
@@ -3575,6 +3563,7 @@
         <p:nvCxnSpPr>
           <p:cNvPr id="71" name="Straight Arrow Connector 70"/>
           <p:cNvCxnSpPr>
+            <a:cxnSpLocks/>
             <a:stCxn id="57" idx="2"/>
             <a:endCxn id="29" idx="0"/>
           </p:cNvCxnSpPr>
@@ -3582,44 +3571,8 @@
         </p:nvCxnSpPr>
         <p:spPr>
           <a:xfrm>
-            <a:off x="5982852" y="1653802"/>
-            <a:ext cx="2025074" cy="1015999"/>
-          </a:xfrm>
-          <a:prstGeom prst="straightConnector1">
-            <a:avLst/>
-          </a:prstGeom>
-          <a:ln w="38100">
-            <a:tailEnd type="triangle"/>
-          </a:ln>
-        </p:spPr>
-        <p:style>
-          <a:lnRef idx="3">
-            <a:schemeClr val="dk1"/>
-          </a:lnRef>
-          <a:fillRef idx="0">
-            <a:schemeClr val="dk1"/>
-          </a:fillRef>
-          <a:effectRef idx="2">
-            <a:schemeClr val="dk1"/>
-          </a:effectRef>
-          <a:fontRef idx="minor">
-            <a:schemeClr val="tx1"/>
-          </a:fontRef>
-        </p:style>
-      </p:cxnSp>
-      <p:cxnSp>
-        <p:nvCxnSpPr>
-          <p:cNvPr id="74" name="Straight Arrow Connector 73"/>
-          <p:cNvCxnSpPr>
-            <a:stCxn id="35" idx="2"/>
-            <a:endCxn id="36" idx="0"/>
-          </p:cNvCxnSpPr>
-          <p:nvPr/>
-        </p:nvCxnSpPr>
-        <p:spPr>
-          <a:xfrm>
-            <a:off x="3957780" y="3550785"/>
-            <a:ext cx="0" cy="2120595"/>
+            <a:off x="5989697" y="2972811"/>
+            <a:ext cx="1878071" cy="438727"/>
           </a:xfrm>
           <a:prstGeom prst="straightConnector1">
             <a:avLst/>
@@ -3647,15 +3600,16 @@
         <p:nvCxnSpPr>
           <p:cNvPr id="79" name="Straight Arrow Connector 78"/>
           <p:cNvCxnSpPr>
-            <a:stCxn id="31" idx="1"/>
-            <a:endCxn id="36" idx="3"/>
+            <a:cxnSpLocks/>
+            <a:stCxn id="61" idx="2"/>
+            <a:endCxn id="36" idx="0"/>
           </p:cNvCxnSpPr>
           <p:nvPr/>
         </p:nvCxnSpPr>
         <p:spPr>
           <a:xfrm flipH="1">
-            <a:off x="4738252" y="6110107"/>
-            <a:ext cx="464128" cy="0"/>
+            <a:off x="4831317" y="4419048"/>
+            <a:ext cx="1132604" cy="866438"/>
           </a:xfrm>
           <a:prstGeom prst="straightConnector1">
             <a:avLst/>
@@ -3673,6 +3627,380 @@
           </a:fillRef>
           <a:effectRef idx="2">
             <a:schemeClr val="dk1"/>
+          </a:effectRef>
+          <a:fontRef idx="minor">
+            <a:schemeClr val="tx1"/>
+          </a:fontRef>
+        </p:style>
+      </p:cxnSp>
+      <p:sp>
+        <p:nvSpPr>
+          <p:cNvPr id="38" name="Rounded Rectangle 31">
+            <a:extLst>
+              <a:ext uri="{FF2B5EF4-FFF2-40B4-BE49-F238E27FC236}">
+                <a16:creationId xmlns:a16="http://schemas.microsoft.com/office/drawing/2014/main" id="{173E53A3-4D29-4337-85D9-C9B5425E3FDB}"/>
+              </a:ext>
+            </a:extLst>
+          </p:cNvPr>
+          <p:cNvSpPr/>
+          <p:nvPr/>
+        </p:nvSpPr>
+        <p:spPr>
+          <a:xfrm>
+            <a:off x="6153989" y="864592"/>
+            <a:ext cx="1990238" cy="640080"/>
+          </a:xfrm>
+          <a:prstGeom prst="roundRect">
+            <a:avLst/>
+          </a:prstGeom>
+        </p:spPr>
+        <p:style>
+          <a:lnRef idx="2">
+            <a:schemeClr val="accent1">
+              <a:shade val="50000"/>
+            </a:schemeClr>
+          </a:lnRef>
+          <a:fillRef idx="1">
+            <a:schemeClr val="accent1"/>
+          </a:fillRef>
+          <a:effectRef idx="0">
+            <a:schemeClr val="accent1"/>
+          </a:effectRef>
+          <a:fontRef idx="minor">
+            <a:schemeClr val="lt1"/>
+          </a:fontRef>
+        </p:style>
+        <p:txBody>
+          <a:bodyPr rtlCol="0" anchor="ctr"/>
+          <a:lstStyle/>
+          <a:p>
+            <a:pPr algn="ctr"/>
+            <a:r>
+              <a:rPr lang="en-US" dirty="0"/>
+              <a:t>Position, Velocity, Acceleration</a:t>
+            </a:r>
+          </a:p>
+        </p:txBody>
+      </p:sp>
+      <p:sp>
+        <p:nvSpPr>
+          <p:cNvPr id="39" name="Rounded Rectangle 31">
+            <a:extLst>
+              <a:ext uri="{FF2B5EF4-FFF2-40B4-BE49-F238E27FC236}">
+                <a16:creationId xmlns:a16="http://schemas.microsoft.com/office/drawing/2014/main" id="{9A1018D7-5BD4-4CE8-9002-93EC13B9D045}"/>
+              </a:ext>
+            </a:extLst>
+          </p:cNvPr>
+          <p:cNvSpPr/>
+          <p:nvPr/>
+        </p:nvSpPr>
+        <p:spPr>
+          <a:xfrm>
+            <a:off x="3741015" y="1974957"/>
+            <a:ext cx="1990238" cy="541937"/>
+          </a:xfrm>
+          <a:prstGeom prst="roundRect">
+            <a:avLst/>
+          </a:prstGeom>
+        </p:spPr>
+        <p:style>
+          <a:lnRef idx="2">
+            <a:schemeClr val="accent1">
+              <a:shade val="50000"/>
+            </a:schemeClr>
+          </a:lnRef>
+          <a:fillRef idx="1">
+            <a:schemeClr val="accent1"/>
+          </a:fillRef>
+          <a:effectRef idx="0">
+            <a:schemeClr val="accent1"/>
+          </a:effectRef>
+          <a:fontRef idx="minor">
+            <a:schemeClr val="lt1"/>
+          </a:fontRef>
+        </p:style>
+        <p:txBody>
+          <a:bodyPr rtlCol="0" anchor="ctr"/>
+          <a:lstStyle/>
+          <a:p>
+            <a:pPr algn="ctr"/>
+            <a:r>
+              <a:rPr lang="en-US" dirty="0"/>
+              <a:t>Moments</a:t>
+            </a:r>
+          </a:p>
+        </p:txBody>
+      </p:sp>
+      <p:sp>
+        <p:nvSpPr>
+          <p:cNvPr id="40" name="Rounded Rectangle 31">
+            <a:extLst>
+              <a:ext uri="{FF2B5EF4-FFF2-40B4-BE49-F238E27FC236}">
+                <a16:creationId xmlns:a16="http://schemas.microsoft.com/office/drawing/2014/main" id="{42CDDE26-C6B4-4376-82F5-1B042AF1D309}"/>
+              </a:ext>
+            </a:extLst>
+          </p:cNvPr>
+          <p:cNvSpPr/>
+          <p:nvPr/>
+        </p:nvSpPr>
+        <p:spPr>
+          <a:xfrm>
+            <a:off x="6151870" y="1691553"/>
+            <a:ext cx="1990238" cy="1108747"/>
+          </a:xfrm>
+          <a:prstGeom prst="roundRect">
+            <a:avLst/>
+          </a:prstGeom>
+        </p:spPr>
+        <p:style>
+          <a:lnRef idx="2">
+            <a:schemeClr val="accent1">
+              <a:shade val="50000"/>
+            </a:schemeClr>
+          </a:lnRef>
+          <a:fillRef idx="1">
+            <a:schemeClr val="accent1"/>
+          </a:fillRef>
+          <a:effectRef idx="0">
+            <a:schemeClr val="accent1"/>
+          </a:effectRef>
+          <a:fontRef idx="minor">
+            <a:schemeClr val="lt1"/>
+          </a:fontRef>
+        </p:style>
+        <p:txBody>
+          <a:bodyPr rtlCol="0" anchor="ctr"/>
+          <a:lstStyle/>
+          <a:p>
+            <a:pPr algn="ctr"/>
+            <a:r>
+              <a:rPr lang="en-US" dirty="0"/>
+              <a:t>Orientation, Angular Velocity, Angular Acceleration</a:t>
+            </a:r>
+          </a:p>
+        </p:txBody>
+      </p:sp>
+      <p:cxnSp>
+        <p:nvCxnSpPr>
+          <p:cNvPr id="95" name="Connector: Elbow 94">
+            <a:extLst>
+              <a:ext uri="{FF2B5EF4-FFF2-40B4-BE49-F238E27FC236}">
+                <a16:creationId xmlns:a16="http://schemas.microsoft.com/office/drawing/2014/main" id="{7E7BC152-7215-4E4F-A6A4-B3252FD0148E}"/>
+              </a:ext>
+            </a:extLst>
+          </p:cNvPr>
+          <p:cNvCxnSpPr>
+            <a:cxnSpLocks/>
+            <a:stCxn id="35" idx="2"/>
+            <a:endCxn id="31" idx="3"/>
+          </p:cNvCxnSpPr>
+          <p:nvPr/>
+        </p:nvCxnSpPr>
+        <p:spPr>
+          <a:xfrm rot="5400000">
+            <a:off x="7083889" y="2872627"/>
+            <a:ext cx="3696246" cy="2006926"/>
+          </a:xfrm>
+          <a:prstGeom prst="bentConnector2">
+            <a:avLst/>
+          </a:prstGeom>
+          <a:ln w="38100">
+            <a:solidFill>
+              <a:schemeClr val="tx1"/>
+            </a:solidFill>
+            <a:headEnd type="none" w="med" len="med"/>
+            <a:tailEnd type="triangle" w="med" len="med"/>
+          </a:ln>
+        </p:spPr>
+        <p:style>
+          <a:lnRef idx="1">
+            <a:schemeClr val="accent1"/>
+          </a:lnRef>
+          <a:fillRef idx="0">
+            <a:schemeClr val="accent1"/>
+          </a:fillRef>
+          <a:effectRef idx="0">
+            <a:schemeClr val="accent1"/>
+          </a:effectRef>
+          <a:fontRef idx="minor">
+            <a:schemeClr val="tx1"/>
+          </a:fontRef>
+        </p:style>
+      </p:cxnSp>
+      <p:cxnSp>
+        <p:nvCxnSpPr>
+          <p:cNvPr id="96" name="Straight Arrow Connector 95">
+            <a:extLst>
+              <a:ext uri="{FF2B5EF4-FFF2-40B4-BE49-F238E27FC236}">
+                <a16:creationId xmlns:a16="http://schemas.microsoft.com/office/drawing/2014/main" id="{83898015-6F8F-4655-AD39-CF68BE880734}"/>
+              </a:ext>
+            </a:extLst>
+          </p:cNvPr>
+          <p:cNvCxnSpPr>
+            <a:cxnSpLocks/>
+            <a:stCxn id="28" idx="3"/>
+            <a:endCxn id="5" idx="1"/>
+          </p:cNvCxnSpPr>
+          <p:nvPr/>
+        </p:nvCxnSpPr>
+        <p:spPr>
+          <a:xfrm>
+            <a:off x="4879223" y="3850265"/>
+            <a:ext cx="330001" cy="0"/>
+          </a:xfrm>
+          <a:prstGeom prst="straightConnector1">
+            <a:avLst/>
+          </a:prstGeom>
+          <a:ln w="38100">
+            <a:tailEnd type="triangle"/>
+          </a:ln>
+        </p:spPr>
+        <p:style>
+          <a:lnRef idx="3">
+            <a:schemeClr val="dk1"/>
+          </a:lnRef>
+          <a:fillRef idx="0">
+            <a:schemeClr val="dk1"/>
+          </a:fillRef>
+          <a:effectRef idx="2">
+            <a:schemeClr val="dk1"/>
+          </a:effectRef>
+          <a:fontRef idx="minor">
+            <a:schemeClr val="tx1"/>
+          </a:fontRef>
+        </p:style>
+      </p:cxnSp>
+      <p:cxnSp>
+        <p:nvCxnSpPr>
+          <p:cNvPr id="102" name="Straight Arrow Connector 101">
+            <a:extLst>
+              <a:ext uri="{FF2B5EF4-FFF2-40B4-BE49-F238E27FC236}">
+                <a16:creationId xmlns:a16="http://schemas.microsoft.com/office/drawing/2014/main" id="{0668BE1F-9B1A-4A49-85F7-EF0A238320CB}"/>
+              </a:ext>
+            </a:extLst>
+          </p:cNvPr>
+          <p:cNvCxnSpPr>
+            <a:cxnSpLocks/>
+            <a:stCxn id="32" idx="3"/>
+            <a:endCxn id="38" idx="1"/>
+          </p:cNvCxnSpPr>
+          <p:nvPr/>
+        </p:nvCxnSpPr>
+        <p:spPr>
+          <a:xfrm>
+            <a:off x="5731253" y="1179017"/>
+            <a:ext cx="422736" cy="5615"/>
+          </a:xfrm>
+          <a:prstGeom prst="straightConnector1">
+            <a:avLst/>
+          </a:prstGeom>
+          <a:ln w="38100">
+            <a:headEnd type="triangle" w="med" len="med"/>
+            <a:tailEnd type="triangle" w="med" len="med"/>
+          </a:ln>
+        </p:spPr>
+        <p:style>
+          <a:lnRef idx="3">
+            <a:schemeClr val="dk1"/>
+          </a:lnRef>
+          <a:fillRef idx="0">
+            <a:schemeClr val="dk1"/>
+          </a:fillRef>
+          <a:effectRef idx="2">
+            <a:schemeClr val="dk1"/>
+          </a:effectRef>
+          <a:fontRef idx="minor">
+            <a:schemeClr val="tx1"/>
+          </a:fontRef>
+        </p:style>
+      </p:cxnSp>
+      <p:cxnSp>
+        <p:nvCxnSpPr>
+          <p:cNvPr id="105" name="Straight Arrow Connector 104">
+            <a:extLst>
+              <a:ext uri="{FF2B5EF4-FFF2-40B4-BE49-F238E27FC236}">
+                <a16:creationId xmlns:a16="http://schemas.microsoft.com/office/drawing/2014/main" id="{B3FBAC7E-E625-4D1D-B9A4-A25321F70A8F}"/>
+              </a:ext>
+            </a:extLst>
+          </p:cNvPr>
+          <p:cNvCxnSpPr>
+            <a:cxnSpLocks/>
+            <a:stCxn id="39" idx="3"/>
+            <a:endCxn id="40" idx="1"/>
+          </p:cNvCxnSpPr>
+          <p:nvPr/>
+        </p:nvCxnSpPr>
+        <p:spPr>
+          <a:xfrm>
+            <a:off x="5731253" y="2245926"/>
+            <a:ext cx="420617" cy="1"/>
+          </a:xfrm>
+          <a:prstGeom prst="straightConnector1">
+            <a:avLst/>
+          </a:prstGeom>
+          <a:ln w="38100">
+            <a:headEnd type="triangle" w="med" len="med"/>
+            <a:tailEnd type="triangle" w="med" len="med"/>
+          </a:ln>
+        </p:spPr>
+        <p:style>
+          <a:lnRef idx="3">
+            <a:schemeClr val="dk1"/>
+          </a:lnRef>
+          <a:fillRef idx="0">
+            <a:schemeClr val="dk1"/>
+          </a:fillRef>
+          <a:effectRef idx="2">
+            <a:schemeClr val="dk1"/>
+          </a:effectRef>
+          <a:fontRef idx="minor">
+            <a:schemeClr val="tx1"/>
+          </a:fontRef>
+        </p:style>
+      </p:cxnSp>
+      <p:cxnSp>
+        <p:nvCxnSpPr>
+          <p:cNvPr id="44" name="Connector: Elbow 43">
+            <a:extLst>
+              <a:ext uri="{FF2B5EF4-FFF2-40B4-BE49-F238E27FC236}">
+                <a16:creationId xmlns:a16="http://schemas.microsoft.com/office/drawing/2014/main" id="{2992022B-9C81-4C27-8338-E6A6D783D7A3}"/>
+              </a:ext>
+            </a:extLst>
+          </p:cNvPr>
+          <p:cNvCxnSpPr>
+            <a:cxnSpLocks/>
+            <a:stCxn id="35" idx="2"/>
+            <a:endCxn id="36" idx="2"/>
+          </p:cNvCxnSpPr>
+          <p:nvPr/>
+        </p:nvCxnSpPr>
+        <p:spPr>
+          <a:xfrm rot="5400000">
+            <a:off x="5315910" y="1543374"/>
+            <a:ext cx="4134973" cy="5104158"/>
+          </a:xfrm>
+          <a:prstGeom prst="bentConnector3">
+            <a:avLst>
+              <a:gd name="adj1" fmla="val 105528"/>
+            </a:avLst>
+          </a:prstGeom>
+          <a:ln w="38100">
+            <a:solidFill>
+              <a:schemeClr val="tx1"/>
+            </a:solidFill>
+            <a:headEnd type="none" w="med" len="med"/>
+            <a:tailEnd type="triangle" w="med" len="med"/>
+          </a:ln>
+        </p:spPr>
+        <p:style>
+          <a:lnRef idx="1">
+            <a:schemeClr val="accent1"/>
+          </a:lnRef>
+          <a:fillRef idx="0">
+            <a:schemeClr val="accent1"/>
+          </a:fillRef>
+          <a:effectRef idx="0">
+            <a:schemeClr val="accent1"/>
           </a:effectRef>
           <a:fontRef idx="minor">
             <a:schemeClr val="tx1"/>
@@ -3723,7 +4051,7 @@
                                           </p:stCondLst>
                                         </p:cTn>
                                         <p:tgtEl>
-                                          <p:spTgt spid="27"/>
+                                          <p:spTgt spid="57"/>
                                         </p:tgtEl>
                                         <p:attrNameLst>
                                           <p:attrName>style.visibility</p:attrName>
@@ -3737,7 +4065,7 @@
                                       <p:cBhvr>
                                         <p:cTn id="7" dur="500"/>
                                         <p:tgtEl>
-                                          <p:spTgt spid="27"/>
+                                          <p:spTgt spid="57"/>
                                         </p:tgtEl>
                                       </p:cBhvr>
                                     </p:animEffect>
@@ -3816,7 +4144,7 @@
                             </p:stCondLst>
                             <p:childTnLst>
                               <p:par>
-                                <p:cTn id="15" presetID="10" presetClass="entr" presetSubtype="0" fill="hold" grpId="0" nodeType="clickEffect">
+                                <p:cTn id="15" presetID="10" presetClass="entr" presetSubtype="0" fill="hold" nodeType="clickEffect">
                                   <p:stCondLst>
                                     <p:cond delay="0"/>
                                   </p:stCondLst>
@@ -3829,7 +4157,7 @@
                                           </p:stCondLst>
                                         </p:cTn>
                                         <p:tgtEl>
-                                          <p:spTgt spid="34"/>
+                                          <p:spTgt spid="102"/>
                                         </p:tgtEl>
                                         <p:attrNameLst>
                                           <p:attrName>style.visibility</p:attrName>
@@ -3843,7 +4171,42 @@
                                       <p:cBhvr>
                                         <p:cTn id="17" dur="500"/>
                                         <p:tgtEl>
-                                          <p:spTgt spid="34"/>
+                                          <p:spTgt spid="102"/>
+                                        </p:tgtEl>
+                                      </p:cBhvr>
+                                    </p:animEffect>
+                                  </p:childTnLst>
+                                </p:cTn>
+                              </p:par>
+                              <p:par>
+                                <p:cTn id="18" presetID="10" presetClass="entr" presetSubtype="0" fill="hold" grpId="0" nodeType="withEffect">
+                                  <p:stCondLst>
+                                    <p:cond delay="0"/>
+                                  </p:stCondLst>
+                                  <p:childTnLst>
+                                    <p:set>
+                                      <p:cBhvr>
+                                        <p:cTn id="19" dur="1" fill="hold">
+                                          <p:stCondLst>
+                                            <p:cond delay="0"/>
+                                          </p:stCondLst>
+                                        </p:cTn>
+                                        <p:tgtEl>
+                                          <p:spTgt spid="38"/>
+                                        </p:tgtEl>
+                                        <p:attrNameLst>
+                                          <p:attrName>style.visibility</p:attrName>
+                                        </p:attrNameLst>
+                                      </p:cBhvr>
+                                      <p:to>
+                                        <p:strVal val="visible"/>
+                                      </p:to>
+                                    </p:set>
+                                    <p:animEffect transition="in" filter="fade">
+                                      <p:cBhvr>
+                                        <p:cTn id="20" dur="500"/>
+                                        <p:tgtEl>
+                                          <p:spTgt spid="38"/>
                                         </p:tgtEl>
                                       </p:cBhvr>
                                     </p:animEffect>
@@ -3857,32 +4220,32 @@
                     </p:cTn>
                   </p:par>
                   <p:par>
-                    <p:cTn id="18" fill="hold">
+                    <p:cTn id="21" fill="hold">
                       <p:stCondLst>
                         <p:cond delay="indefinite"/>
                       </p:stCondLst>
                       <p:childTnLst>
                         <p:par>
-                          <p:cTn id="19" fill="hold">
+                          <p:cTn id="22" fill="hold">
                             <p:stCondLst>
                               <p:cond delay="0"/>
                             </p:stCondLst>
                             <p:childTnLst>
                               <p:par>
-                                <p:cTn id="20" presetID="10" presetClass="entr" presetSubtype="0" fill="hold" grpId="0" nodeType="clickEffect">
+                                <p:cTn id="23" presetID="10" presetClass="entr" presetSubtype="0" fill="hold" grpId="0" nodeType="clickEffect">
                                   <p:stCondLst>
                                     <p:cond delay="0"/>
                                   </p:stCondLst>
                                   <p:childTnLst>
                                     <p:set>
                                       <p:cBhvr>
-                                        <p:cTn id="21" dur="1" fill="hold">
+                                        <p:cTn id="24" dur="1" fill="hold">
                                           <p:stCondLst>
                                             <p:cond delay="0"/>
                                           </p:stCondLst>
                                         </p:cTn>
                                         <p:tgtEl>
-                                          <p:spTgt spid="57"/>
+                                          <p:spTgt spid="39"/>
                                         </p:tgtEl>
                                         <p:attrNameLst>
                                           <p:attrName>style.visibility</p:attrName>
@@ -3894,9 +4257,9 @@
                                     </p:set>
                                     <p:animEffect transition="in" filter="fade">
                                       <p:cBhvr>
-                                        <p:cTn id="22" dur="500"/>
+                                        <p:cTn id="25" dur="500"/>
                                         <p:tgtEl>
-                                          <p:spTgt spid="57"/>
+                                          <p:spTgt spid="39"/>
                                         </p:tgtEl>
                                       </p:cBhvr>
                                     </p:animEffect>
@@ -3910,26 +4273,677 @@
                     </p:cTn>
                   </p:par>
                   <p:par>
-                    <p:cTn id="23" fill="hold">
+                    <p:cTn id="26" fill="hold">
                       <p:stCondLst>
                         <p:cond delay="indefinite"/>
                       </p:stCondLst>
                       <p:childTnLst>
                         <p:par>
-                          <p:cTn id="24" fill="hold">
+                          <p:cTn id="27" fill="hold">
                             <p:stCondLst>
                               <p:cond delay="0"/>
                             </p:stCondLst>
                             <p:childTnLst>
                               <p:par>
-                                <p:cTn id="25" presetID="10" presetClass="entr" presetSubtype="0" fill="hold" grpId="0" nodeType="clickEffect">
+                                <p:cTn id="28" presetID="10" presetClass="entr" presetSubtype="0" fill="hold" nodeType="clickEffect">
                                   <p:stCondLst>
                                     <p:cond delay="0"/>
                                   </p:stCondLst>
                                   <p:childTnLst>
                                     <p:set>
                                       <p:cBhvr>
-                                        <p:cTn id="26" dur="1" fill="hold">
+                                        <p:cTn id="29" dur="1" fill="hold">
+                                          <p:stCondLst>
+                                            <p:cond delay="0"/>
+                                          </p:stCondLst>
+                                        </p:cTn>
+                                        <p:tgtEl>
+                                          <p:spTgt spid="105"/>
+                                        </p:tgtEl>
+                                        <p:attrNameLst>
+                                          <p:attrName>style.visibility</p:attrName>
+                                        </p:attrNameLst>
+                                      </p:cBhvr>
+                                      <p:to>
+                                        <p:strVal val="visible"/>
+                                      </p:to>
+                                    </p:set>
+                                    <p:animEffect transition="in" filter="fade">
+                                      <p:cBhvr>
+                                        <p:cTn id="30" dur="500"/>
+                                        <p:tgtEl>
+                                          <p:spTgt spid="105"/>
+                                        </p:tgtEl>
+                                      </p:cBhvr>
+                                    </p:animEffect>
+                                  </p:childTnLst>
+                                </p:cTn>
+                              </p:par>
+                              <p:par>
+                                <p:cTn id="31" presetID="10" presetClass="entr" presetSubtype="0" fill="hold" grpId="0" nodeType="withEffect">
+                                  <p:stCondLst>
+                                    <p:cond delay="0"/>
+                                  </p:stCondLst>
+                                  <p:childTnLst>
+                                    <p:set>
+                                      <p:cBhvr>
+                                        <p:cTn id="32" dur="1" fill="hold">
+                                          <p:stCondLst>
+                                            <p:cond delay="0"/>
+                                          </p:stCondLst>
+                                        </p:cTn>
+                                        <p:tgtEl>
+                                          <p:spTgt spid="40"/>
+                                        </p:tgtEl>
+                                        <p:attrNameLst>
+                                          <p:attrName>style.visibility</p:attrName>
+                                        </p:attrNameLst>
+                                      </p:cBhvr>
+                                      <p:to>
+                                        <p:strVal val="visible"/>
+                                      </p:to>
+                                    </p:set>
+                                    <p:animEffect transition="in" filter="fade">
+                                      <p:cBhvr>
+                                        <p:cTn id="33" dur="500"/>
+                                        <p:tgtEl>
+                                          <p:spTgt spid="40"/>
+                                        </p:tgtEl>
+                                      </p:cBhvr>
+                                    </p:animEffect>
+                                  </p:childTnLst>
+                                </p:cTn>
+                              </p:par>
+                            </p:childTnLst>
+                          </p:cTn>
+                        </p:par>
+                      </p:childTnLst>
+                    </p:cTn>
+                  </p:par>
+                  <p:par>
+                    <p:cTn id="34" fill="hold">
+                      <p:stCondLst>
+                        <p:cond delay="indefinite"/>
+                      </p:stCondLst>
+                      <p:childTnLst>
+                        <p:par>
+                          <p:cTn id="35" fill="hold">
+                            <p:stCondLst>
+                              <p:cond delay="0"/>
+                            </p:stCondLst>
+                            <p:childTnLst>
+                              <p:par>
+                                <p:cTn id="36" presetID="10" presetClass="entr" presetSubtype="0" fill="hold" grpId="0" nodeType="clickEffect">
+                                  <p:stCondLst>
+                                    <p:cond delay="0"/>
+                                  </p:stCondLst>
+                                  <p:childTnLst>
+                                    <p:set>
+                                      <p:cBhvr>
+                                        <p:cTn id="37" dur="1" fill="hold">
+                                          <p:stCondLst>
+                                            <p:cond delay="0"/>
+                                          </p:stCondLst>
+                                        </p:cTn>
+                                        <p:tgtEl>
+                                          <p:spTgt spid="28"/>
+                                        </p:tgtEl>
+                                        <p:attrNameLst>
+                                          <p:attrName>style.visibility</p:attrName>
+                                        </p:attrNameLst>
+                                      </p:cBhvr>
+                                      <p:to>
+                                        <p:strVal val="visible"/>
+                                      </p:to>
+                                    </p:set>
+                                    <p:animEffect transition="in" filter="fade">
+                                      <p:cBhvr>
+                                        <p:cTn id="38" dur="500"/>
+                                        <p:tgtEl>
+                                          <p:spTgt spid="28"/>
+                                        </p:tgtEl>
+                                      </p:cBhvr>
+                                    </p:animEffect>
+                                  </p:childTnLst>
+                                </p:cTn>
+                              </p:par>
+                              <p:par>
+                                <p:cTn id="39" presetID="10" presetClass="entr" presetSubtype="0" fill="hold" nodeType="withEffect">
+                                  <p:stCondLst>
+                                    <p:cond delay="0"/>
+                                  </p:stCondLst>
+                                  <p:childTnLst>
+                                    <p:set>
+                                      <p:cBhvr>
+                                        <p:cTn id="40" dur="1" fill="hold">
+                                          <p:stCondLst>
+                                            <p:cond delay="0"/>
+                                          </p:stCondLst>
+                                        </p:cTn>
+                                        <p:tgtEl>
+                                          <p:spTgt spid="68"/>
+                                        </p:tgtEl>
+                                        <p:attrNameLst>
+                                          <p:attrName>style.visibility</p:attrName>
+                                        </p:attrNameLst>
+                                      </p:cBhvr>
+                                      <p:to>
+                                        <p:strVal val="visible"/>
+                                      </p:to>
+                                    </p:set>
+                                    <p:animEffect transition="in" filter="fade">
+                                      <p:cBhvr>
+                                        <p:cTn id="41" dur="500"/>
+                                        <p:tgtEl>
+                                          <p:spTgt spid="68"/>
+                                        </p:tgtEl>
+                                      </p:cBhvr>
+                                    </p:animEffect>
+                                  </p:childTnLst>
+                                </p:cTn>
+                              </p:par>
+                            </p:childTnLst>
+                          </p:cTn>
+                        </p:par>
+                      </p:childTnLst>
+                    </p:cTn>
+                  </p:par>
+                  <p:par>
+                    <p:cTn id="42" fill="hold">
+                      <p:stCondLst>
+                        <p:cond delay="indefinite"/>
+                      </p:stCondLst>
+                      <p:childTnLst>
+                        <p:par>
+                          <p:cTn id="43" fill="hold">
+                            <p:stCondLst>
+                              <p:cond delay="0"/>
+                            </p:stCondLst>
+                            <p:childTnLst>
+                              <p:par>
+                                <p:cTn id="44" presetID="10" presetClass="entr" presetSubtype="0" fill="hold" nodeType="clickEffect">
+                                  <p:stCondLst>
+                                    <p:cond delay="0"/>
+                                  </p:stCondLst>
+                                  <p:childTnLst>
+                                    <p:set>
+                                      <p:cBhvr>
+                                        <p:cTn id="45" dur="1" fill="hold">
+                                          <p:stCondLst>
+                                            <p:cond delay="0"/>
+                                          </p:stCondLst>
+                                        </p:cTn>
+                                        <p:tgtEl>
+                                          <p:spTgt spid="49"/>
+                                        </p:tgtEl>
+                                        <p:attrNameLst>
+                                          <p:attrName>style.visibility</p:attrName>
+                                        </p:attrNameLst>
+                                      </p:cBhvr>
+                                      <p:to>
+                                        <p:strVal val="visible"/>
+                                      </p:to>
+                                    </p:set>
+                                    <p:animEffect transition="in" filter="fade">
+                                      <p:cBhvr>
+                                        <p:cTn id="46" dur="500"/>
+                                        <p:tgtEl>
+                                          <p:spTgt spid="49"/>
+                                        </p:tgtEl>
+                                      </p:cBhvr>
+                                    </p:animEffect>
+                                  </p:childTnLst>
+                                </p:cTn>
+                              </p:par>
+                              <p:par>
+                                <p:cTn id="47" presetID="10" presetClass="entr" presetSubtype="0" fill="hold" grpId="0" nodeType="withEffect">
+                                  <p:stCondLst>
+                                    <p:cond delay="0"/>
+                                  </p:stCondLst>
+                                  <p:childTnLst>
+                                    <p:set>
+                                      <p:cBhvr>
+                                        <p:cTn id="48" dur="1" fill="hold">
+                                          <p:stCondLst>
+                                            <p:cond delay="0"/>
+                                          </p:stCondLst>
+                                        </p:cTn>
+                                        <p:tgtEl>
+                                          <p:spTgt spid="5"/>
+                                        </p:tgtEl>
+                                        <p:attrNameLst>
+                                          <p:attrName>style.visibility</p:attrName>
+                                        </p:attrNameLst>
+                                      </p:cBhvr>
+                                      <p:to>
+                                        <p:strVal val="visible"/>
+                                      </p:to>
+                                    </p:set>
+                                    <p:animEffect transition="in" filter="fade">
+                                      <p:cBhvr>
+                                        <p:cTn id="49" dur="500"/>
+                                        <p:tgtEl>
+                                          <p:spTgt spid="5"/>
+                                        </p:tgtEl>
+                                      </p:cBhvr>
+                                    </p:animEffect>
+                                  </p:childTnLst>
+                                </p:cTn>
+                              </p:par>
+                              <p:par>
+                                <p:cTn id="50" presetID="10" presetClass="entr" presetSubtype="0" fill="hold" nodeType="withEffect">
+                                  <p:stCondLst>
+                                    <p:cond delay="0"/>
+                                  </p:stCondLst>
+                                  <p:childTnLst>
+                                    <p:set>
+                                      <p:cBhvr>
+                                        <p:cTn id="51" dur="1" fill="hold">
+                                          <p:stCondLst>
+                                            <p:cond delay="0"/>
+                                          </p:stCondLst>
+                                        </p:cTn>
+                                        <p:tgtEl>
+                                          <p:spTgt spid="96"/>
+                                        </p:tgtEl>
+                                        <p:attrNameLst>
+                                          <p:attrName>style.visibility</p:attrName>
+                                        </p:attrNameLst>
+                                      </p:cBhvr>
+                                      <p:to>
+                                        <p:strVal val="visible"/>
+                                      </p:to>
+                                    </p:set>
+                                    <p:animEffect transition="in" filter="fade">
+                                      <p:cBhvr>
+                                        <p:cTn id="52" dur="500"/>
+                                        <p:tgtEl>
+                                          <p:spTgt spid="96"/>
+                                        </p:tgtEl>
+                                      </p:cBhvr>
+                                    </p:animEffect>
+                                  </p:childTnLst>
+                                </p:cTn>
+                              </p:par>
+                            </p:childTnLst>
+                          </p:cTn>
+                        </p:par>
+                      </p:childTnLst>
+                    </p:cTn>
+                  </p:par>
+                  <p:par>
+                    <p:cTn id="53" fill="hold">
+                      <p:stCondLst>
+                        <p:cond delay="indefinite"/>
+                      </p:stCondLst>
+                      <p:childTnLst>
+                        <p:par>
+                          <p:cTn id="54" fill="hold">
+                            <p:stCondLst>
+                              <p:cond delay="0"/>
+                            </p:stCondLst>
+                            <p:childTnLst>
+                              <p:par>
+                                <p:cTn id="55" presetID="10" presetClass="entr" presetSubtype="0" fill="hold" nodeType="clickEffect">
+                                  <p:stCondLst>
+                                    <p:cond delay="0"/>
+                                  </p:stCondLst>
+                                  <p:childTnLst>
+                                    <p:set>
+                                      <p:cBhvr>
+                                        <p:cTn id="56" dur="1" fill="hold">
+                                          <p:stCondLst>
+                                            <p:cond delay="0"/>
+                                          </p:stCondLst>
+                                        </p:cTn>
+                                        <p:tgtEl>
+                                          <p:spTgt spid="71"/>
+                                        </p:tgtEl>
+                                        <p:attrNameLst>
+                                          <p:attrName>style.visibility</p:attrName>
+                                        </p:attrNameLst>
+                                      </p:cBhvr>
+                                      <p:to>
+                                        <p:strVal val="visible"/>
+                                      </p:to>
+                                    </p:set>
+                                    <p:animEffect transition="in" filter="fade">
+                                      <p:cBhvr>
+                                        <p:cTn id="57" dur="500"/>
+                                        <p:tgtEl>
+                                          <p:spTgt spid="71"/>
+                                        </p:tgtEl>
+                                      </p:cBhvr>
+                                    </p:animEffect>
+                                  </p:childTnLst>
+                                </p:cTn>
+                              </p:par>
+                              <p:par>
+                                <p:cTn id="58" presetID="10" presetClass="entr" presetSubtype="0" fill="hold" grpId="0" nodeType="withEffect">
+                                  <p:stCondLst>
+                                    <p:cond delay="0"/>
+                                  </p:stCondLst>
+                                  <p:childTnLst>
+                                    <p:set>
+                                      <p:cBhvr>
+                                        <p:cTn id="59" dur="1" fill="hold">
+                                          <p:stCondLst>
+                                            <p:cond delay="0"/>
+                                          </p:stCondLst>
+                                        </p:cTn>
+                                        <p:tgtEl>
+                                          <p:spTgt spid="29"/>
+                                        </p:tgtEl>
+                                        <p:attrNameLst>
+                                          <p:attrName>style.visibility</p:attrName>
+                                        </p:attrNameLst>
+                                      </p:cBhvr>
+                                      <p:to>
+                                        <p:strVal val="visible"/>
+                                      </p:to>
+                                    </p:set>
+                                    <p:animEffect transition="in" filter="fade">
+                                      <p:cBhvr>
+                                        <p:cTn id="60" dur="500"/>
+                                        <p:tgtEl>
+                                          <p:spTgt spid="29"/>
+                                        </p:tgtEl>
+                                      </p:cBhvr>
+                                    </p:animEffect>
+                                  </p:childTnLst>
+                                </p:cTn>
+                              </p:par>
+                            </p:childTnLst>
+                          </p:cTn>
+                        </p:par>
+                      </p:childTnLst>
+                    </p:cTn>
+                  </p:par>
+                  <p:par>
+                    <p:cTn id="61" fill="hold">
+                      <p:stCondLst>
+                        <p:cond delay="indefinite"/>
+                      </p:stCondLst>
+                      <p:childTnLst>
+                        <p:par>
+                          <p:cTn id="62" fill="hold">
+                            <p:stCondLst>
+                              <p:cond delay="0"/>
+                            </p:stCondLst>
+                            <p:childTnLst>
+                              <p:par>
+                                <p:cTn id="63" presetID="10" presetClass="entr" presetSubtype="0" fill="hold" grpId="0" nodeType="clickEffect">
+                                  <p:stCondLst>
+                                    <p:cond delay="0"/>
+                                  </p:stCondLst>
+                                  <p:childTnLst>
+                                    <p:set>
+                                      <p:cBhvr>
+                                        <p:cTn id="64" dur="1" fill="hold">
+                                          <p:stCondLst>
+                                            <p:cond delay="0"/>
+                                          </p:stCondLst>
+                                        </p:cTn>
+                                        <p:tgtEl>
+                                          <p:spTgt spid="61"/>
+                                        </p:tgtEl>
+                                        <p:attrNameLst>
+                                          <p:attrName>style.visibility</p:attrName>
+                                        </p:attrNameLst>
+                                      </p:cBhvr>
+                                      <p:to>
+                                        <p:strVal val="visible"/>
+                                      </p:to>
+                                    </p:set>
+                                    <p:animEffect transition="in" filter="fade">
+                                      <p:cBhvr>
+                                        <p:cTn id="65" dur="500"/>
+                                        <p:tgtEl>
+                                          <p:spTgt spid="61"/>
+                                        </p:tgtEl>
+                                      </p:cBhvr>
+                                    </p:animEffect>
+                                  </p:childTnLst>
+                                </p:cTn>
+                              </p:par>
+                            </p:childTnLst>
+                          </p:cTn>
+                        </p:par>
+                      </p:childTnLst>
+                    </p:cTn>
+                  </p:par>
+                  <p:par>
+                    <p:cTn id="66" fill="hold">
+                      <p:stCondLst>
+                        <p:cond delay="indefinite"/>
+                      </p:stCondLst>
+                      <p:childTnLst>
+                        <p:par>
+                          <p:cTn id="67" fill="hold">
+                            <p:stCondLst>
+                              <p:cond delay="0"/>
+                            </p:stCondLst>
+                            <p:childTnLst>
+                              <p:par>
+                                <p:cTn id="68" presetID="10" presetClass="entr" presetSubtype="0" fill="hold" nodeType="clickEffect">
+                                  <p:stCondLst>
+                                    <p:cond delay="0"/>
+                                  </p:stCondLst>
+                                  <p:childTnLst>
+                                    <p:set>
+                                      <p:cBhvr>
+                                        <p:cTn id="69" dur="1" fill="hold">
+                                          <p:stCondLst>
+                                            <p:cond delay="0"/>
+                                          </p:stCondLst>
+                                        </p:cTn>
+                                        <p:tgtEl>
+                                          <p:spTgt spid="79"/>
+                                        </p:tgtEl>
+                                        <p:attrNameLst>
+                                          <p:attrName>style.visibility</p:attrName>
+                                        </p:attrNameLst>
+                                      </p:cBhvr>
+                                      <p:to>
+                                        <p:strVal val="visible"/>
+                                      </p:to>
+                                    </p:set>
+                                    <p:animEffect transition="in" filter="fade">
+                                      <p:cBhvr>
+                                        <p:cTn id="70" dur="500"/>
+                                        <p:tgtEl>
+                                          <p:spTgt spid="79"/>
+                                        </p:tgtEl>
+                                      </p:cBhvr>
+                                    </p:animEffect>
+                                  </p:childTnLst>
+                                </p:cTn>
+                              </p:par>
+                              <p:par>
+                                <p:cTn id="71" presetID="10" presetClass="entr" presetSubtype="0" fill="hold" grpId="0" nodeType="withEffect">
+                                  <p:stCondLst>
+                                    <p:cond delay="0"/>
+                                  </p:stCondLst>
+                                  <p:childTnLst>
+                                    <p:set>
+                                      <p:cBhvr>
+                                        <p:cTn id="72" dur="1" fill="hold">
+                                          <p:stCondLst>
+                                            <p:cond delay="0"/>
+                                          </p:stCondLst>
+                                        </p:cTn>
+                                        <p:tgtEl>
+                                          <p:spTgt spid="36"/>
+                                        </p:tgtEl>
+                                        <p:attrNameLst>
+                                          <p:attrName>style.visibility</p:attrName>
+                                        </p:attrNameLst>
+                                      </p:cBhvr>
+                                      <p:to>
+                                        <p:strVal val="visible"/>
+                                      </p:to>
+                                    </p:set>
+                                    <p:animEffect transition="in" filter="fade">
+                                      <p:cBhvr>
+                                        <p:cTn id="73" dur="500"/>
+                                        <p:tgtEl>
+                                          <p:spTgt spid="36"/>
+                                        </p:tgtEl>
+                                      </p:cBhvr>
+                                    </p:animEffect>
+                                  </p:childTnLst>
+                                </p:cTn>
+                              </p:par>
+                            </p:childTnLst>
+                          </p:cTn>
+                        </p:par>
+                      </p:childTnLst>
+                    </p:cTn>
+                  </p:par>
+                  <p:par>
+                    <p:cTn id="74" fill="hold">
+                      <p:stCondLst>
+                        <p:cond delay="indefinite"/>
+                      </p:stCondLst>
+                      <p:childTnLst>
+                        <p:par>
+                          <p:cTn id="75" fill="hold">
+                            <p:stCondLst>
+                              <p:cond delay="0"/>
+                            </p:stCondLst>
+                            <p:childTnLst>
+                              <p:par>
+                                <p:cTn id="76" presetID="10" presetClass="entr" presetSubtype="0" fill="hold" nodeType="clickEffect">
+                                  <p:stCondLst>
+                                    <p:cond delay="0"/>
+                                  </p:stCondLst>
+                                  <p:childTnLst>
+                                    <p:set>
+                                      <p:cBhvr>
+                                        <p:cTn id="77" dur="1" fill="hold">
+                                          <p:stCondLst>
+                                            <p:cond delay="0"/>
+                                          </p:stCondLst>
+                                        </p:cTn>
+                                        <p:tgtEl>
+                                          <p:spTgt spid="14"/>
+                                        </p:tgtEl>
+                                        <p:attrNameLst>
+                                          <p:attrName>style.visibility</p:attrName>
+                                        </p:attrNameLst>
+                                      </p:cBhvr>
+                                      <p:to>
+                                        <p:strVal val="visible"/>
+                                      </p:to>
+                                    </p:set>
+                                    <p:animEffect transition="in" filter="fade">
+                                      <p:cBhvr>
+                                        <p:cTn id="78" dur="500"/>
+                                        <p:tgtEl>
+                                          <p:spTgt spid="14"/>
+                                        </p:tgtEl>
+                                      </p:cBhvr>
+                                    </p:animEffect>
+                                  </p:childTnLst>
+                                </p:cTn>
+                              </p:par>
+                              <p:par>
+                                <p:cTn id="79" presetID="10" presetClass="entr" presetSubtype="0" fill="hold" grpId="0" nodeType="withEffect">
+                                  <p:stCondLst>
+                                    <p:cond delay="0"/>
+                                  </p:stCondLst>
+                                  <p:childTnLst>
+                                    <p:set>
+                                      <p:cBhvr>
+                                        <p:cTn id="80" dur="1" fill="hold">
+                                          <p:stCondLst>
+                                            <p:cond delay="0"/>
+                                          </p:stCondLst>
+                                        </p:cTn>
+                                        <p:tgtEl>
+                                          <p:spTgt spid="31"/>
+                                        </p:tgtEl>
+                                        <p:attrNameLst>
+                                          <p:attrName>style.visibility</p:attrName>
+                                        </p:attrNameLst>
+                                      </p:cBhvr>
+                                      <p:to>
+                                        <p:strVal val="visible"/>
+                                      </p:to>
+                                    </p:set>
+                                    <p:animEffect transition="in" filter="fade">
+                                      <p:cBhvr>
+                                        <p:cTn id="81" dur="500"/>
+                                        <p:tgtEl>
+                                          <p:spTgt spid="31"/>
+                                        </p:tgtEl>
+                                      </p:cBhvr>
+                                    </p:animEffect>
+                                  </p:childTnLst>
+                                </p:cTn>
+                              </p:par>
+                            </p:childTnLst>
+                          </p:cTn>
+                        </p:par>
+                      </p:childTnLst>
+                    </p:cTn>
+                  </p:par>
+                  <p:par>
+                    <p:cTn id="82" fill="hold">
+                      <p:stCondLst>
+                        <p:cond delay="indefinite"/>
+                      </p:stCondLst>
+                      <p:childTnLst>
+                        <p:par>
+                          <p:cTn id="83" fill="hold">
+                            <p:stCondLst>
+                              <p:cond delay="0"/>
+                            </p:stCondLst>
+                            <p:childTnLst>
+                              <p:par>
+                                <p:cTn id="84" presetID="10" presetClass="entr" presetSubtype="0" fill="hold" nodeType="clickEffect">
+                                  <p:stCondLst>
+                                    <p:cond delay="0"/>
+                                  </p:stCondLst>
+                                  <p:childTnLst>
+                                    <p:set>
+                                      <p:cBhvr>
+                                        <p:cTn id="85" dur="1" fill="hold">
+                                          <p:stCondLst>
+                                            <p:cond delay="0"/>
+                                          </p:stCondLst>
+                                        </p:cTn>
+                                        <p:tgtEl>
+                                          <p:spTgt spid="65"/>
+                                        </p:tgtEl>
+                                        <p:attrNameLst>
+                                          <p:attrName>style.visibility</p:attrName>
+                                        </p:attrNameLst>
+                                      </p:cBhvr>
+                                      <p:to>
+                                        <p:strVal val="visible"/>
+                                      </p:to>
+                                    </p:set>
+                                    <p:animEffect transition="in" filter="fade">
+                                      <p:cBhvr>
+                                        <p:cTn id="86" dur="500"/>
+                                        <p:tgtEl>
+                                          <p:spTgt spid="65"/>
+                                        </p:tgtEl>
+                                      </p:cBhvr>
+                                    </p:animEffect>
+                                  </p:childTnLst>
+                                </p:cTn>
+                              </p:par>
+                              <p:par>
+                                <p:cTn id="87" presetID="10" presetClass="entr" presetSubtype="0" fill="hold" grpId="0" nodeType="withEffect">
+                                  <p:stCondLst>
+                                    <p:cond delay="0"/>
+                                  </p:stCondLst>
+                                  <p:childTnLst>
+                                    <p:set>
+                                      <p:cBhvr>
+                                        <p:cTn id="88" dur="1" fill="hold">
                                           <p:stCondLst>
                                             <p:cond delay="0"/>
                                           </p:stCondLst>
@@ -3947,7 +4961,7 @@
                                     </p:set>
                                     <p:animEffect transition="in" filter="fade">
                                       <p:cBhvr>
-                                        <p:cTn id="27" dur="500"/>
+                                        <p:cTn id="89" dur="500"/>
                                         <p:tgtEl>
                                           <p:spTgt spid="35"/>
                                         </p:tgtEl>
@@ -3957,20 +4971,20 @@
                                 </p:cTn>
                               </p:par>
                               <p:par>
-                                <p:cTn id="28" presetID="10" presetClass="entr" presetSubtype="0" fill="hold" nodeType="withEffect">
+                                <p:cTn id="90" presetID="10" presetClass="entr" presetSubtype="0" fill="hold" nodeType="withEffect">
                                   <p:stCondLst>
                                     <p:cond delay="0"/>
                                   </p:stCondLst>
                                   <p:childTnLst>
                                     <p:set>
                                       <p:cBhvr>
-                                        <p:cTn id="29" dur="1" fill="hold">
+                                        <p:cTn id="91" dur="1" fill="hold">
                                           <p:stCondLst>
                                             <p:cond delay="0"/>
                                           </p:stCondLst>
                                         </p:cTn>
                                         <p:tgtEl>
-                                          <p:spTgt spid="65"/>
+                                          <p:spTgt spid="44"/>
                                         </p:tgtEl>
                                         <p:attrNameLst>
                                           <p:attrName>style.visibility</p:attrName>
@@ -3982,48 +4996,30 @@
                                     </p:set>
                                     <p:animEffect transition="in" filter="fade">
                                       <p:cBhvr>
-                                        <p:cTn id="30" dur="500"/>
+                                        <p:cTn id="92" dur="500"/>
                                         <p:tgtEl>
-                                          <p:spTgt spid="65"/>
+                                          <p:spTgt spid="44"/>
                                         </p:tgtEl>
                                       </p:cBhvr>
                                     </p:animEffect>
                                   </p:childTnLst>
                                 </p:cTn>
                               </p:par>
-                            </p:childTnLst>
-                          </p:cTn>
-                        </p:par>
-                      </p:childTnLst>
-                    </p:cTn>
-                  </p:par>
-                  <p:par>
-                    <p:cTn id="31" fill="hold">
-                      <p:stCondLst>
-                        <p:cond delay="indefinite"/>
-                      </p:stCondLst>
-                      <p:childTnLst>
-                        <p:par>
-                          <p:cTn id="32" fill="hold">
-                            <p:stCondLst>
-                              <p:cond delay="0"/>
-                            </p:stCondLst>
-                            <p:childTnLst>
                               <p:par>
-                                <p:cTn id="33" presetID="10" presetClass="entr" presetSubtype="0" fill="hold" grpId="0" nodeType="clickEffect">
+                                <p:cTn id="93" presetID="10" presetClass="entr" presetSubtype="0" fill="hold" nodeType="withEffect">
                                   <p:stCondLst>
                                     <p:cond delay="0"/>
                                   </p:stCondLst>
                                   <p:childTnLst>
                                     <p:set>
                                       <p:cBhvr>
-                                        <p:cTn id="34" dur="1" fill="hold">
+                                        <p:cTn id="94" dur="1" fill="hold">
                                           <p:stCondLst>
                                             <p:cond delay="0"/>
                                           </p:stCondLst>
                                         </p:cTn>
                                         <p:tgtEl>
-                                          <p:spTgt spid="28"/>
+                                          <p:spTgt spid="95"/>
                                         </p:tgtEl>
                                         <p:attrNameLst>
                                           <p:attrName>style.visibility</p:attrName>
@@ -4035,431 +5031,9 @@
                                     </p:set>
                                     <p:animEffect transition="in" filter="fade">
                                       <p:cBhvr>
-                                        <p:cTn id="35" dur="500"/>
+                                        <p:cTn id="95" dur="500"/>
                                         <p:tgtEl>
-                                          <p:spTgt spid="28"/>
-                                        </p:tgtEl>
-                                      </p:cBhvr>
-                                    </p:animEffect>
-                                  </p:childTnLst>
-                                </p:cTn>
-                              </p:par>
-                              <p:par>
-                                <p:cTn id="36" presetID="10" presetClass="entr" presetSubtype="0" fill="hold" nodeType="withEffect">
-                                  <p:stCondLst>
-                                    <p:cond delay="0"/>
-                                  </p:stCondLst>
-                                  <p:childTnLst>
-                                    <p:set>
-                                      <p:cBhvr>
-                                        <p:cTn id="37" dur="1" fill="hold">
-                                          <p:stCondLst>
-                                            <p:cond delay="0"/>
-                                          </p:stCondLst>
-                                        </p:cTn>
-                                        <p:tgtEl>
-                                          <p:spTgt spid="68"/>
-                                        </p:tgtEl>
-                                        <p:attrNameLst>
-                                          <p:attrName>style.visibility</p:attrName>
-                                        </p:attrNameLst>
-                                      </p:cBhvr>
-                                      <p:to>
-                                        <p:strVal val="visible"/>
-                                      </p:to>
-                                    </p:set>
-                                    <p:animEffect transition="in" filter="fade">
-                                      <p:cBhvr>
-                                        <p:cTn id="38" dur="500"/>
-                                        <p:tgtEl>
-                                          <p:spTgt spid="68"/>
-                                        </p:tgtEl>
-                                      </p:cBhvr>
-                                    </p:animEffect>
-                                  </p:childTnLst>
-                                </p:cTn>
-                              </p:par>
-                            </p:childTnLst>
-                          </p:cTn>
-                        </p:par>
-                      </p:childTnLst>
-                    </p:cTn>
-                  </p:par>
-                  <p:par>
-                    <p:cTn id="39" fill="hold">
-                      <p:stCondLst>
-                        <p:cond delay="indefinite"/>
-                      </p:stCondLst>
-                      <p:childTnLst>
-                        <p:par>
-                          <p:cTn id="40" fill="hold">
-                            <p:stCondLst>
-                              <p:cond delay="0"/>
-                            </p:stCondLst>
-                            <p:childTnLst>
-                              <p:par>
-                                <p:cTn id="41" presetID="10" presetClass="entr" presetSubtype="0" fill="hold" nodeType="clickEffect">
-                                  <p:stCondLst>
-                                    <p:cond delay="0"/>
-                                  </p:stCondLst>
-                                  <p:childTnLst>
-                                    <p:set>
-                                      <p:cBhvr>
-                                        <p:cTn id="42" dur="1" fill="hold">
-                                          <p:stCondLst>
-                                            <p:cond delay="0"/>
-                                          </p:stCondLst>
-                                        </p:cTn>
-                                        <p:tgtEl>
-                                          <p:spTgt spid="49"/>
-                                        </p:tgtEl>
-                                        <p:attrNameLst>
-                                          <p:attrName>style.visibility</p:attrName>
-                                        </p:attrNameLst>
-                                      </p:cBhvr>
-                                      <p:to>
-                                        <p:strVal val="visible"/>
-                                      </p:to>
-                                    </p:set>
-                                    <p:animEffect transition="in" filter="fade">
-                                      <p:cBhvr>
-                                        <p:cTn id="43" dur="500"/>
-                                        <p:tgtEl>
-                                          <p:spTgt spid="49"/>
-                                        </p:tgtEl>
-                                      </p:cBhvr>
-                                    </p:animEffect>
-                                  </p:childTnLst>
-                                </p:cTn>
-                              </p:par>
-                              <p:par>
-                                <p:cTn id="44" presetID="10" presetClass="entr" presetSubtype="0" fill="hold" grpId="0" nodeType="withEffect">
-                                  <p:stCondLst>
-                                    <p:cond delay="0"/>
-                                  </p:stCondLst>
-                                  <p:childTnLst>
-                                    <p:set>
-                                      <p:cBhvr>
-                                        <p:cTn id="45" dur="1" fill="hold">
-                                          <p:stCondLst>
-                                            <p:cond delay="0"/>
-                                          </p:stCondLst>
-                                        </p:cTn>
-                                        <p:tgtEl>
-                                          <p:spTgt spid="5"/>
-                                        </p:tgtEl>
-                                        <p:attrNameLst>
-                                          <p:attrName>style.visibility</p:attrName>
-                                        </p:attrNameLst>
-                                      </p:cBhvr>
-                                      <p:to>
-                                        <p:strVal val="visible"/>
-                                      </p:to>
-                                    </p:set>
-                                    <p:animEffect transition="in" filter="fade">
-                                      <p:cBhvr>
-                                        <p:cTn id="46" dur="500"/>
-                                        <p:tgtEl>
-                                          <p:spTgt spid="5"/>
-                                        </p:tgtEl>
-                                      </p:cBhvr>
-                                    </p:animEffect>
-                                  </p:childTnLst>
-                                </p:cTn>
-                              </p:par>
-                            </p:childTnLst>
-                          </p:cTn>
-                        </p:par>
-                      </p:childTnLst>
-                    </p:cTn>
-                  </p:par>
-                  <p:par>
-                    <p:cTn id="47" fill="hold">
-                      <p:stCondLst>
-                        <p:cond delay="indefinite"/>
-                      </p:stCondLst>
-                      <p:childTnLst>
-                        <p:par>
-                          <p:cTn id="48" fill="hold">
-                            <p:stCondLst>
-                              <p:cond delay="0"/>
-                            </p:stCondLst>
-                            <p:childTnLst>
-                              <p:par>
-                                <p:cTn id="49" presetID="10" presetClass="entr" presetSubtype="0" fill="hold" grpId="0" nodeType="clickEffect">
-                                  <p:stCondLst>
-                                    <p:cond delay="0"/>
-                                  </p:stCondLst>
-                                  <p:childTnLst>
-                                    <p:set>
-                                      <p:cBhvr>
-                                        <p:cTn id="50" dur="1" fill="hold">
-                                          <p:stCondLst>
-                                            <p:cond delay="0"/>
-                                          </p:stCondLst>
-                                        </p:cTn>
-                                        <p:tgtEl>
-                                          <p:spTgt spid="29"/>
-                                        </p:tgtEl>
-                                        <p:attrNameLst>
-                                          <p:attrName>style.visibility</p:attrName>
-                                        </p:attrNameLst>
-                                      </p:cBhvr>
-                                      <p:to>
-                                        <p:strVal val="visible"/>
-                                      </p:to>
-                                    </p:set>
-                                    <p:animEffect transition="in" filter="fade">
-                                      <p:cBhvr>
-                                        <p:cTn id="51" dur="500"/>
-                                        <p:tgtEl>
-                                          <p:spTgt spid="29"/>
-                                        </p:tgtEl>
-                                      </p:cBhvr>
-                                    </p:animEffect>
-                                  </p:childTnLst>
-                                </p:cTn>
-                              </p:par>
-                              <p:par>
-                                <p:cTn id="52" presetID="10" presetClass="entr" presetSubtype="0" fill="hold" nodeType="withEffect">
-                                  <p:stCondLst>
-                                    <p:cond delay="0"/>
-                                  </p:stCondLst>
-                                  <p:childTnLst>
-                                    <p:set>
-                                      <p:cBhvr>
-                                        <p:cTn id="53" dur="1" fill="hold">
-                                          <p:stCondLst>
-                                            <p:cond delay="0"/>
-                                          </p:stCondLst>
-                                        </p:cTn>
-                                        <p:tgtEl>
-                                          <p:spTgt spid="71"/>
-                                        </p:tgtEl>
-                                        <p:attrNameLst>
-                                          <p:attrName>style.visibility</p:attrName>
-                                        </p:attrNameLst>
-                                      </p:cBhvr>
-                                      <p:to>
-                                        <p:strVal val="visible"/>
-                                      </p:to>
-                                    </p:set>
-                                    <p:animEffect transition="in" filter="fade">
-                                      <p:cBhvr>
-                                        <p:cTn id="54" dur="500"/>
-                                        <p:tgtEl>
-                                          <p:spTgt spid="71"/>
-                                        </p:tgtEl>
-                                      </p:cBhvr>
-                                    </p:animEffect>
-                                  </p:childTnLst>
-                                </p:cTn>
-                              </p:par>
-                            </p:childTnLst>
-                          </p:cTn>
-                        </p:par>
-                      </p:childTnLst>
-                    </p:cTn>
-                  </p:par>
-                  <p:par>
-                    <p:cTn id="55" fill="hold">
-                      <p:stCondLst>
-                        <p:cond delay="indefinite"/>
-                      </p:stCondLst>
-                      <p:childTnLst>
-                        <p:par>
-                          <p:cTn id="56" fill="hold">
-                            <p:stCondLst>
-                              <p:cond delay="0"/>
-                            </p:stCondLst>
-                            <p:childTnLst>
-                              <p:par>
-                                <p:cTn id="57" presetID="10" presetClass="entr" presetSubtype="0" fill="hold" nodeType="clickEffect">
-                                  <p:stCondLst>
-                                    <p:cond delay="0"/>
-                                  </p:stCondLst>
-                                  <p:childTnLst>
-                                    <p:set>
-                                      <p:cBhvr>
-                                        <p:cTn id="58" dur="1" fill="hold">
-                                          <p:stCondLst>
-                                            <p:cond delay="0"/>
-                                          </p:stCondLst>
-                                        </p:cTn>
-                                        <p:tgtEl>
-                                          <p:spTgt spid="14"/>
-                                        </p:tgtEl>
-                                        <p:attrNameLst>
-                                          <p:attrName>style.visibility</p:attrName>
-                                        </p:attrNameLst>
-                                      </p:cBhvr>
-                                      <p:to>
-                                        <p:strVal val="visible"/>
-                                      </p:to>
-                                    </p:set>
-                                    <p:animEffect transition="in" filter="fade">
-                                      <p:cBhvr>
-                                        <p:cTn id="59" dur="500"/>
-                                        <p:tgtEl>
-                                          <p:spTgt spid="14"/>
-                                        </p:tgtEl>
-                                      </p:cBhvr>
-                                    </p:animEffect>
-                                  </p:childTnLst>
-                                </p:cTn>
-                              </p:par>
-                              <p:par>
-                                <p:cTn id="60" presetID="10" presetClass="entr" presetSubtype="0" fill="hold" grpId="0" nodeType="withEffect">
-                                  <p:stCondLst>
-                                    <p:cond delay="0"/>
-                                  </p:stCondLst>
-                                  <p:childTnLst>
-                                    <p:set>
-                                      <p:cBhvr>
-                                        <p:cTn id="61" dur="1" fill="hold">
-                                          <p:stCondLst>
-                                            <p:cond delay="0"/>
-                                          </p:stCondLst>
-                                        </p:cTn>
-                                        <p:tgtEl>
-                                          <p:spTgt spid="31"/>
-                                        </p:tgtEl>
-                                        <p:attrNameLst>
-                                          <p:attrName>style.visibility</p:attrName>
-                                        </p:attrNameLst>
-                                      </p:cBhvr>
-                                      <p:to>
-                                        <p:strVal val="visible"/>
-                                      </p:to>
-                                    </p:set>
-                                    <p:animEffect transition="in" filter="fade">
-                                      <p:cBhvr>
-                                        <p:cTn id="62" dur="500"/>
-                                        <p:tgtEl>
-                                          <p:spTgt spid="31"/>
-                                        </p:tgtEl>
-                                      </p:cBhvr>
-                                    </p:animEffect>
-                                  </p:childTnLst>
-                                </p:cTn>
-                              </p:par>
-                            </p:childTnLst>
-                          </p:cTn>
-                        </p:par>
-                      </p:childTnLst>
-                    </p:cTn>
-                  </p:par>
-                  <p:par>
-                    <p:cTn id="63" fill="hold">
-                      <p:stCondLst>
-                        <p:cond delay="indefinite"/>
-                      </p:stCondLst>
-                      <p:childTnLst>
-                        <p:par>
-                          <p:cTn id="64" fill="hold">
-                            <p:stCondLst>
-                              <p:cond delay="0"/>
-                            </p:stCondLst>
-                            <p:childTnLst>
-                              <p:par>
-                                <p:cTn id="65" presetID="10" presetClass="entr" presetSubtype="0" fill="hold" nodeType="clickEffect">
-                                  <p:stCondLst>
-                                    <p:cond delay="0"/>
-                                  </p:stCondLst>
-                                  <p:childTnLst>
-                                    <p:set>
-                                      <p:cBhvr>
-                                        <p:cTn id="66" dur="1" fill="hold">
-                                          <p:stCondLst>
-                                            <p:cond delay="0"/>
-                                          </p:stCondLst>
-                                        </p:cTn>
-                                        <p:tgtEl>
-                                          <p:spTgt spid="74"/>
-                                        </p:tgtEl>
-                                        <p:attrNameLst>
-                                          <p:attrName>style.visibility</p:attrName>
-                                        </p:attrNameLst>
-                                      </p:cBhvr>
-                                      <p:to>
-                                        <p:strVal val="visible"/>
-                                      </p:to>
-                                    </p:set>
-                                    <p:animEffect transition="in" filter="fade">
-                                      <p:cBhvr>
-                                        <p:cTn id="67" dur="500"/>
-                                        <p:tgtEl>
-                                          <p:spTgt spid="74"/>
-                                        </p:tgtEl>
-                                      </p:cBhvr>
-                                    </p:animEffect>
-                                  </p:childTnLst>
-                                </p:cTn>
-                              </p:par>
-                              <p:par>
-                                <p:cTn id="68" presetID="10" presetClass="entr" presetSubtype="0" fill="hold" grpId="0" nodeType="withEffect">
-                                  <p:stCondLst>
-                                    <p:cond delay="0"/>
-                                  </p:stCondLst>
-                                  <p:childTnLst>
-                                    <p:set>
-                                      <p:cBhvr>
-                                        <p:cTn id="69" dur="1" fill="hold">
-                                          <p:stCondLst>
-                                            <p:cond delay="0"/>
-                                          </p:stCondLst>
-                                        </p:cTn>
-                                        <p:tgtEl>
-                                          <p:spTgt spid="36"/>
-                                        </p:tgtEl>
-                                        <p:attrNameLst>
-                                          <p:attrName>style.visibility</p:attrName>
-                                        </p:attrNameLst>
-                                      </p:cBhvr>
-                                      <p:to>
-                                        <p:strVal val="visible"/>
-                                      </p:to>
-                                    </p:set>
-                                    <p:animEffect transition="in" filter="fade">
-                                      <p:cBhvr>
-                                        <p:cTn id="70" dur="500"/>
-                                        <p:tgtEl>
-                                          <p:spTgt spid="36"/>
-                                        </p:tgtEl>
-                                      </p:cBhvr>
-                                    </p:animEffect>
-                                  </p:childTnLst>
-                                </p:cTn>
-                              </p:par>
-                              <p:par>
-                                <p:cTn id="71" presetID="10" presetClass="entr" presetSubtype="0" fill="hold" nodeType="withEffect">
-                                  <p:stCondLst>
-                                    <p:cond delay="0"/>
-                                  </p:stCondLst>
-                                  <p:childTnLst>
-                                    <p:set>
-                                      <p:cBhvr>
-                                        <p:cTn id="72" dur="1" fill="hold">
-                                          <p:stCondLst>
-                                            <p:cond delay="0"/>
-                                          </p:stCondLst>
-                                        </p:cTn>
-                                        <p:tgtEl>
-                                          <p:spTgt spid="79"/>
-                                        </p:tgtEl>
-                                        <p:attrNameLst>
-                                          <p:attrName>style.visibility</p:attrName>
-                                        </p:attrNameLst>
-                                      </p:cBhvr>
-                                      <p:to>
-                                        <p:strVal val="visible"/>
-                                      </p:to>
-                                    </p:set>
-                                    <p:animEffect transition="in" filter="fade">
-                                      <p:cBhvr>
-                                        <p:cTn id="73" dur="500"/>
-                                        <p:tgtEl>
-                                          <p:spTgt spid="79"/>
+                                          <p:spTgt spid="95"/>
                                         </p:tgtEl>
                                       </p:cBhvr>
                                     </p:animEffect>
@@ -4494,16 +5068,18 @@
       </p:par>
     </p:tnLst>
     <p:bldLst>
+      <p:bldP spid="61" grpId="0" animBg="1"/>
       <p:bldP spid="57" grpId="0" animBg="1"/>
       <p:bldP spid="5" grpId="0" animBg="1"/>
-      <p:bldP spid="27" grpId="0" animBg="1"/>
       <p:bldP spid="28" grpId="0" animBg="1"/>
       <p:bldP spid="29" grpId="0" animBg="1"/>
       <p:bldP spid="31" grpId="0" animBg="1"/>
       <p:bldP spid="32" grpId="0" animBg="1"/>
-      <p:bldP spid="34" grpId="0" animBg="1"/>
       <p:bldP spid="35" grpId="0" animBg="1"/>
       <p:bldP spid="36" grpId="0" animBg="1"/>
+      <p:bldP spid="38" grpId="0" animBg="1"/>
+      <p:bldP spid="39" grpId="0" animBg="1"/>
+      <p:bldP spid="40" grpId="0" animBg="1"/>
     </p:bldLst>
   </p:timing>
 </p:sld>

</xml_diff>